<commit_message>
a bit of stuff
i tried moving the notebooks to a sub-folder for neatness, but it is proving difficult. I also then found a way to make the pathways stick so i did not have to change them when i move a file. then i started on the portfolio a bit
</commit_message>
<xml_diff>
--- a/Research_Experience_Module/HELP.pptx
+++ b/Research_Experience_Module/HELP.pptx
@@ -4,11 +4,16 @@
   <p:sldMasterIdLst>
     <p:sldMasterId id="2147483648" r:id="rId1"/>
   </p:sldMasterIdLst>
+  <p:notesMasterIdLst>
+    <p:notesMasterId r:id="rId8"/>
+  </p:notesMasterIdLst>
   <p:sldIdLst>
     <p:sldId id="256" r:id="rId2"/>
     <p:sldId id="257" r:id="rId3"/>
-    <p:sldId id="258" r:id="rId4"/>
-    <p:sldId id="259" r:id="rId5"/>
+    <p:sldId id="260" r:id="rId4"/>
+    <p:sldId id="262" r:id="rId5"/>
+    <p:sldId id="259" r:id="rId6"/>
+    <p:sldId id="258" r:id="rId7"/>
   </p:sldIdLst>
   <p:sldSz cx="12192000" cy="6858000"/>
   <p:notesSz cx="6858000" cy="9144000"/>
@@ -115,6 +120,440 @@
 </p:presentation>
 </file>
 
+<file path=ppt/notesMasters/notesMaster1.xml><?xml version="1.0" encoding="utf-8"?>
+<p:notesMaster xmlns:a="http://schemas.openxmlformats.org/drawingml/2006/main" xmlns:r="http://schemas.openxmlformats.org/officeDocument/2006/relationships" xmlns:p="http://schemas.openxmlformats.org/presentationml/2006/main">
+  <p:cSld>
+    <p:bg>
+      <p:bgRef idx="1001">
+        <a:schemeClr val="bg1"/>
+      </p:bgRef>
+    </p:bg>
+    <p:spTree>
+      <p:nvGrpSpPr>
+        <p:cNvPr id="1" name=""/>
+        <p:cNvGrpSpPr/>
+        <p:nvPr/>
+      </p:nvGrpSpPr>
+      <p:grpSpPr>
+        <a:xfrm>
+          <a:off x="0" y="0"/>
+          <a:ext cx="0" cy="0"/>
+          <a:chOff x="0" y="0"/>
+          <a:chExt cx="0" cy="0"/>
+        </a:xfrm>
+      </p:grpSpPr>
+      <p:sp>
+        <p:nvSpPr>
+          <p:cNvPr id="2" name="Header Placeholder 1"/>
+          <p:cNvSpPr>
+            <a:spLocks noGrp="1"/>
+          </p:cNvSpPr>
+          <p:nvPr>
+            <p:ph type="hdr" sz="quarter"/>
+          </p:nvPr>
+        </p:nvSpPr>
+        <p:spPr>
+          <a:xfrm>
+            <a:off x="0" y="0"/>
+            <a:ext cx="2971800" cy="458788"/>
+          </a:xfrm>
+          <a:prstGeom prst="rect">
+            <a:avLst/>
+          </a:prstGeom>
+        </p:spPr>
+        <p:txBody>
+          <a:bodyPr vert="horz" lIns="91440" tIns="45720" rIns="91440" bIns="45720" rtlCol="0"/>
+          <a:lstStyle>
+            <a:lvl1pPr algn="l">
+              <a:defRPr sz="1200"/>
+            </a:lvl1pPr>
+          </a:lstStyle>
+          <a:p>
+            <a:endParaRPr lang="en-GB"/>
+          </a:p>
+        </p:txBody>
+      </p:sp>
+      <p:sp>
+        <p:nvSpPr>
+          <p:cNvPr id="3" name="Date Placeholder 2"/>
+          <p:cNvSpPr>
+            <a:spLocks noGrp="1"/>
+          </p:cNvSpPr>
+          <p:nvPr>
+            <p:ph type="dt" idx="1"/>
+          </p:nvPr>
+        </p:nvSpPr>
+        <p:spPr>
+          <a:xfrm>
+            <a:off x="3884613" y="0"/>
+            <a:ext cx="2971800" cy="458788"/>
+          </a:xfrm>
+          <a:prstGeom prst="rect">
+            <a:avLst/>
+          </a:prstGeom>
+        </p:spPr>
+        <p:txBody>
+          <a:bodyPr vert="horz" lIns="91440" tIns="45720" rIns="91440" bIns="45720" rtlCol="0"/>
+          <a:lstStyle>
+            <a:lvl1pPr algn="r">
+              <a:defRPr sz="1200"/>
+            </a:lvl1pPr>
+          </a:lstStyle>
+          <a:p>
+            <a:fld id="{28D2BB41-E5FE-4762-B217-ABB3FF3317C9}" type="datetimeFigureOut">
+              <a:rPr lang="en-GB" smtClean="0"/>
+              <a:t>12/04/2025</a:t>
+            </a:fld>
+            <a:endParaRPr lang="en-GB"/>
+          </a:p>
+        </p:txBody>
+      </p:sp>
+      <p:sp>
+        <p:nvSpPr>
+          <p:cNvPr id="4" name="Slide Image Placeholder 3"/>
+          <p:cNvSpPr>
+            <a:spLocks noGrp="1" noRot="1" noChangeAspect="1"/>
+          </p:cNvSpPr>
+          <p:nvPr>
+            <p:ph type="sldImg" idx="2"/>
+          </p:nvPr>
+        </p:nvSpPr>
+        <p:spPr>
+          <a:xfrm>
+            <a:off x="685800" y="1143000"/>
+            <a:ext cx="5486400" cy="3086100"/>
+          </a:xfrm>
+          <a:prstGeom prst="rect">
+            <a:avLst/>
+          </a:prstGeom>
+          <a:noFill/>
+          <a:ln w="12700">
+            <a:solidFill>
+              <a:prstClr val="black"/>
+            </a:solidFill>
+          </a:ln>
+        </p:spPr>
+        <p:txBody>
+          <a:bodyPr vert="horz" lIns="91440" tIns="45720" rIns="91440" bIns="45720" rtlCol="0" anchor="ctr"/>
+          <a:lstStyle/>
+          <a:p>
+            <a:endParaRPr lang="en-GB"/>
+          </a:p>
+        </p:txBody>
+      </p:sp>
+      <p:sp>
+        <p:nvSpPr>
+          <p:cNvPr id="5" name="Notes Placeholder 4"/>
+          <p:cNvSpPr>
+            <a:spLocks noGrp="1"/>
+          </p:cNvSpPr>
+          <p:nvPr>
+            <p:ph type="body" sz="quarter" idx="3"/>
+          </p:nvPr>
+        </p:nvSpPr>
+        <p:spPr>
+          <a:xfrm>
+            <a:off x="685800" y="4400550"/>
+            <a:ext cx="5486400" cy="3600450"/>
+          </a:xfrm>
+          <a:prstGeom prst="rect">
+            <a:avLst/>
+          </a:prstGeom>
+        </p:spPr>
+        <p:txBody>
+          <a:bodyPr vert="horz" lIns="91440" tIns="45720" rIns="91440" bIns="45720" rtlCol="0"/>
+          <a:lstStyle/>
+          <a:p>
+            <a:pPr lvl="0"/>
+            <a:r>
+              <a:rPr lang="en-US"/>
+              <a:t>Click to edit Master text styles</a:t>
+            </a:r>
+          </a:p>
+          <a:p>
+            <a:pPr lvl="1"/>
+            <a:r>
+              <a:rPr lang="en-US"/>
+              <a:t>Second level</a:t>
+            </a:r>
+          </a:p>
+          <a:p>
+            <a:pPr lvl="2"/>
+            <a:r>
+              <a:rPr lang="en-US"/>
+              <a:t>Third level</a:t>
+            </a:r>
+          </a:p>
+          <a:p>
+            <a:pPr lvl="3"/>
+            <a:r>
+              <a:rPr lang="en-US"/>
+              <a:t>Fourth level</a:t>
+            </a:r>
+          </a:p>
+          <a:p>
+            <a:pPr lvl="4"/>
+            <a:r>
+              <a:rPr lang="en-US"/>
+              <a:t>Fifth level</a:t>
+            </a:r>
+            <a:endParaRPr lang="en-GB"/>
+          </a:p>
+        </p:txBody>
+      </p:sp>
+      <p:sp>
+        <p:nvSpPr>
+          <p:cNvPr id="6" name="Footer Placeholder 5"/>
+          <p:cNvSpPr>
+            <a:spLocks noGrp="1"/>
+          </p:cNvSpPr>
+          <p:nvPr>
+            <p:ph type="ftr" sz="quarter" idx="4"/>
+          </p:nvPr>
+        </p:nvSpPr>
+        <p:spPr>
+          <a:xfrm>
+            <a:off x="0" y="8685213"/>
+            <a:ext cx="2971800" cy="458787"/>
+          </a:xfrm>
+          <a:prstGeom prst="rect">
+            <a:avLst/>
+          </a:prstGeom>
+        </p:spPr>
+        <p:txBody>
+          <a:bodyPr vert="horz" lIns="91440" tIns="45720" rIns="91440" bIns="45720" rtlCol="0" anchor="b"/>
+          <a:lstStyle>
+            <a:lvl1pPr algn="l">
+              <a:defRPr sz="1200"/>
+            </a:lvl1pPr>
+          </a:lstStyle>
+          <a:p>
+            <a:endParaRPr lang="en-GB"/>
+          </a:p>
+        </p:txBody>
+      </p:sp>
+      <p:sp>
+        <p:nvSpPr>
+          <p:cNvPr id="7" name="Slide Number Placeholder 6"/>
+          <p:cNvSpPr>
+            <a:spLocks noGrp="1"/>
+          </p:cNvSpPr>
+          <p:nvPr>
+            <p:ph type="sldNum" sz="quarter" idx="5"/>
+          </p:nvPr>
+        </p:nvSpPr>
+        <p:spPr>
+          <a:xfrm>
+            <a:off x="3884613" y="8685213"/>
+            <a:ext cx="2971800" cy="458787"/>
+          </a:xfrm>
+          <a:prstGeom prst="rect">
+            <a:avLst/>
+          </a:prstGeom>
+        </p:spPr>
+        <p:txBody>
+          <a:bodyPr vert="horz" lIns="91440" tIns="45720" rIns="91440" bIns="45720" rtlCol="0" anchor="b"/>
+          <a:lstStyle>
+            <a:lvl1pPr algn="r">
+              <a:defRPr sz="1200"/>
+            </a:lvl1pPr>
+          </a:lstStyle>
+          <a:p>
+            <a:fld id="{7B1E87B4-5E8D-409D-BC10-9EE84D32B27F}" type="slidenum">
+              <a:rPr lang="en-GB" smtClean="0"/>
+              <a:t>‹#›</a:t>
+            </a:fld>
+            <a:endParaRPr lang="en-GB"/>
+          </a:p>
+        </p:txBody>
+      </p:sp>
+    </p:spTree>
+    <p:extLst>
+      <p:ext uri="{BB962C8B-B14F-4D97-AF65-F5344CB8AC3E}">
+        <p14:creationId xmlns:p14="http://schemas.microsoft.com/office/powerpoint/2010/main" val="3897149640"/>
+      </p:ext>
+    </p:extLst>
+  </p:cSld>
+  <p:clrMap bg1="lt1" tx1="dk1" bg2="lt2" tx2="dk2" accent1="accent1" accent2="accent2" accent3="accent3" accent4="accent4" accent5="accent5" accent6="accent6" hlink="hlink" folHlink="folHlink"/>
+  <p:notesStyle>
+    <a:lvl1pPr marL="0" algn="l" defTabSz="914400" rtl="0" eaLnBrk="1" latinLnBrk="0" hangingPunct="1">
+      <a:defRPr sz="1200" kern="1200">
+        <a:solidFill>
+          <a:schemeClr val="tx1"/>
+        </a:solidFill>
+        <a:latin typeface="+mn-lt"/>
+        <a:ea typeface="+mn-ea"/>
+        <a:cs typeface="+mn-cs"/>
+      </a:defRPr>
+    </a:lvl1pPr>
+    <a:lvl2pPr marL="457200" algn="l" defTabSz="914400" rtl="0" eaLnBrk="1" latinLnBrk="0" hangingPunct="1">
+      <a:defRPr sz="1200" kern="1200">
+        <a:solidFill>
+          <a:schemeClr val="tx1"/>
+        </a:solidFill>
+        <a:latin typeface="+mn-lt"/>
+        <a:ea typeface="+mn-ea"/>
+        <a:cs typeface="+mn-cs"/>
+      </a:defRPr>
+    </a:lvl2pPr>
+    <a:lvl3pPr marL="914400" algn="l" defTabSz="914400" rtl="0" eaLnBrk="1" latinLnBrk="0" hangingPunct="1">
+      <a:defRPr sz="1200" kern="1200">
+        <a:solidFill>
+          <a:schemeClr val="tx1"/>
+        </a:solidFill>
+        <a:latin typeface="+mn-lt"/>
+        <a:ea typeface="+mn-ea"/>
+        <a:cs typeface="+mn-cs"/>
+      </a:defRPr>
+    </a:lvl3pPr>
+    <a:lvl4pPr marL="1371600" algn="l" defTabSz="914400" rtl="0" eaLnBrk="1" latinLnBrk="0" hangingPunct="1">
+      <a:defRPr sz="1200" kern="1200">
+        <a:solidFill>
+          <a:schemeClr val="tx1"/>
+        </a:solidFill>
+        <a:latin typeface="+mn-lt"/>
+        <a:ea typeface="+mn-ea"/>
+        <a:cs typeface="+mn-cs"/>
+      </a:defRPr>
+    </a:lvl4pPr>
+    <a:lvl5pPr marL="1828800" algn="l" defTabSz="914400" rtl="0" eaLnBrk="1" latinLnBrk="0" hangingPunct="1">
+      <a:defRPr sz="1200" kern="1200">
+        <a:solidFill>
+          <a:schemeClr val="tx1"/>
+        </a:solidFill>
+        <a:latin typeface="+mn-lt"/>
+        <a:ea typeface="+mn-ea"/>
+        <a:cs typeface="+mn-cs"/>
+      </a:defRPr>
+    </a:lvl5pPr>
+    <a:lvl6pPr marL="2286000" algn="l" defTabSz="914400" rtl="0" eaLnBrk="1" latinLnBrk="0" hangingPunct="1">
+      <a:defRPr sz="1200" kern="1200">
+        <a:solidFill>
+          <a:schemeClr val="tx1"/>
+        </a:solidFill>
+        <a:latin typeface="+mn-lt"/>
+        <a:ea typeface="+mn-ea"/>
+        <a:cs typeface="+mn-cs"/>
+      </a:defRPr>
+    </a:lvl6pPr>
+    <a:lvl7pPr marL="2743200" algn="l" defTabSz="914400" rtl="0" eaLnBrk="1" latinLnBrk="0" hangingPunct="1">
+      <a:defRPr sz="1200" kern="1200">
+        <a:solidFill>
+          <a:schemeClr val="tx1"/>
+        </a:solidFill>
+        <a:latin typeface="+mn-lt"/>
+        <a:ea typeface="+mn-ea"/>
+        <a:cs typeface="+mn-cs"/>
+      </a:defRPr>
+    </a:lvl7pPr>
+    <a:lvl8pPr marL="3200400" algn="l" defTabSz="914400" rtl="0" eaLnBrk="1" latinLnBrk="0" hangingPunct="1">
+      <a:defRPr sz="1200" kern="1200">
+        <a:solidFill>
+          <a:schemeClr val="tx1"/>
+        </a:solidFill>
+        <a:latin typeface="+mn-lt"/>
+        <a:ea typeface="+mn-ea"/>
+        <a:cs typeface="+mn-cs"/>
+      </a:defRPr>
+    </a:lvl8pPr>
+    <a:lvl9pPr marL="3657600" algn="l" defTabSz="914400" rtl="0" eaLnBrk="1" latinLnBrk="0" hangingPunct="1">
+      <a:defRPr sz="1200" kern="1200">
+        <a:solidFill>
+          <a:schemeClr val="tx1"/>
+        </a:solidFill>
+        <a:latin typeface="+mn-lt"/>
+        <a:ea typeface="+mn-ea"/>
+        <a:cs typeface="+mn-cs"/>
+      </a:defRPr>
+    </a:lvl9pPr>
+  </p:notesStyle>
+</p:notesMaster>
+</file>
+
+<file path=ppt/notesSlides/notesSlide1.xml><?xml version="1.0" encoding="utf-8"?>
+<p:notes xmlns:a="http://schemas.openxmlformats.org/drawingml/2006/main" xmlns:r="http://schemas.openxmlformats.org/officeDocument/2006/relationships" xmlns:p="http://schemas.openxmlformats.org/presentationml/2006/main">
+  <p:cSld>
+    <p:spTree>
+      <p:nvGrpSpPr>
+        <p:cNvPr id="1" name=""/>
+        <p:cNvGrpSpPr/>
+        <p:nvPr/>
+      </p:nvGrpSpPr>
+      <p:grpSpPr>
+        <a:xfrm>
+          <a:off x="0" y="0"/>
+          <a:ext cx="0" cy="0"/>
+          <a:chOff x="0" y="0"/>
+          <a:chExt cx="0" cy="0"/>
+        </a:xfrm>
+      </p:grpSpPr>
+      <p:sp>
+        <p:nvSpPr>
+          <p:cNvPr id="2" name="Slide Image Placeholder 1"/>
+          <p:cNvSpPr>
+            <a:spLocks noGrp="1" noRot="1" noChangeAspect="1"/>
+          </p:cNvSpPr>
+          <p:nvPr>
+            <p:ph type="sldImg"/>
+          </p:nvPr>
+        </p:nvSpPr>
+        <p:spPr/>
+      </p:sp>
+      <p:sp>
+        <p:nvSpPr>
+          <p:cNvPr id="3" name="Notes Placeholder 2"/>
+          <p:cNvSpPr>
+            <a:spLocks noGrp="1"/>
+          </p:cNvSpPr>
+          <p:nvPr>
+            <p:ph type="body" idx="1"/>
+          </p:nvPr>
+        </p:nvSpPr>
+        <p:spPr/>
+        <p:txBody>
+          <a:bodyPr/>
+          <a:lstStyle/>
+          <a:p>
+            <a:endParaRPr lang="en-GB" dirty="0"/>
+          </a:p>
+        </p:txBody>
+      </p:sp>
+      <p:sp>
+        <p:nvSpPr>
+          <p:cNvPr id="4" name="Slide Number Placeholder 3"/>
+          <p:cNvSpPr>
+            <a:spLocks noGrp="1"/>
+          </p:cNvSpPr>
+          <p:nvPr>
+            <p:ph type="sldNum" sz="quarter" idx="5"/>
+          </p:nvPr>
+        </p:nvSpPr>
+        <p:spPr/>
+        <p:txBody>
+          <a:bodyPr/>
+          <a:lstStyle/>
+          <a:p>
+            <a:fld id="{7B1E87B4-5E8D-409D-BC10-9EE84D32B27F}" type="slidenum">
+              <a:rPr lang="en-GB" smtClean="0"/>
+              <a:t>4</a:t>
+            </a:fld>
+            <a:endParaRPr lang="en-GB"/>
+          </a:p>
+        </p:txBody>
+      </p:sp>
+    </p:spTree>
+    <p:extLst>
+      <p:ext uri="{BB962C8B-B14F-4D97-AF65-F5344CB8AC3E}">
+        <p14:creationId xmlns:p14="http://schemas.microsoft.com/office/powerpoint/2010/main" val="947659403"/>
+      </p:ext>
+    </p:extLst>
+  </p:cSld>
+  <p:clrMapOvr>
+    <a:masterClrMapping/>
+  </p:clrMapOvr>
+</p:notes>
+</file>
+
 <file path=ppt/slideLayouts/slideLayout1.xml><?xml version="1.0" encoding="utf-8"?>
 <p:sldLayout xmlns:a="http://schemas.openxmlformats.org/drawingml/2006/main" xmlns:r="http://schemas.openxmlformats.org/officeDocument/2006/relationships" xmlns:p="http://schemas.openxmlformats.org/presentationml/2006/main" type="title" preserve="1">
   <p:cSld name="Title Slide">
@@ -264,7 +703,7 @@
           <a:p>
             <a:fld id="{19CC63F1-1467-4B40-81F5-9E42679AB802}" type="datetimeFigureOut">
               <a:rPr lang="en-GB" smtClean="0"/>
-              <a:t>05/02/2025</a:t>
+              <a:t>12/04/2025</a:t>
             </a:fld>
             <a:endParaRPr lang="en-GB"/>
           </a:p>
@@ -464,7 +903,7 @@
           <a:p>
             <a:fld id="{19CC63F1-1467-4B40-81F5-9E42679AB802}" type="datetimeFigureOut">
               <a:rPr lang="en-GB" smtClean="0"/>
-              <a:t>05/02/2025</a:t>
+              <a:t>12/04/2025</a:t>
             </a:fld>
             <a:endParaRPr lang="en-GB"/>
           </a:p>
@@ -674,7 +1113,7 @@
           <a:p>
             <a:fld id="{19CC63F1-1467-4B40-81F5-9E42679AB802}" type="datetimeFigureOut">
               <a:rPr lang="en-GB" smtClean="0"/>
-              <a:t>05/02/2025</a:t>
+              <a:t>12/04/2025</a:t>
             </a:fld>
             <a:endParaRPr lang="en-GB"/>
           </a:p>
@@ -874,7 +1313,7 @@
           <a:p>
             <a:fld id="{19CC63F1-1467-4B40-81F5-9E42679AB802}" type="datetimeFigureOut">
               <a:rPr lang="en-GB" smtClean="0"/>
-              <a:t>05/02/2025</a:t>
+              <a:t>12/04/2025</a:t>
             </a:fld>
             <a:endParaRPr lang="en-GB"/>
           </a:p>
@@ -1150,7 +1589,7 @@
           <a:p>
             <a:fld id="{19CC63F1-1467-4B40-81F5-9E42679AB802}" type="datetimeFigureOut">
               <a:rPr lang="en-GB" smtClean="0"/>
-              <a:t>05/02/2025</a:t>
+              <a:t>12/04/2025</a:t>
             </a:fld>
             <a:endParaRPr lang="en-GB"/>
           </a:p>
@@ -1418,7 +1857,7 @@
           <a:p>
             <a:fld id="{19CC63F1-1467-4B40-81F5-9E42679AB802}" type="datetimeFigureOut">
               <a:rPr lang="en-GB" smtClean="0"/>
-              <a:t>05/02/2025</a:t>
+              <a:t>12/04/2025</a:t>
             </a:fld>
             <a:endParaRPr lang="en-GB"/>
           </a:p>
@@ -1833,7 +2272,7 @@
           <a:p>
             <a:fld id="{19CC63F1-1467-4B40-81F5-9E42679AB802}" type="datetimeFigureOut">
               <a:rPr lang="en-GB" smtClean="0"/>
-              <a:t>05/02/2025</a:t>
+              <a:t>12/04/2025</a:t>
             </a:fld>
             <a:endParaRPr lang="en-GB"/>
           </a:p>
@@ -1975,7 +2414,7 @@
           <a:p>
             <a:fld id="{19CC63F1-1467-4B40-81F5-9E42679AB802}" type="datetimeFigureOut">
               <a:rPr lang="en-GB" smtClean="0"/>
-              <a:t>05/02/2025</a:t>
+              <a:t>12/04/2025</a:t>
             </a:fld>
             <a:endParaRPr lang="en-GB"/>
           </a:p>
@@ -2088,7 +2527,7 @@
           <a:p>
             <a:fld id="{19CC63F1-1467-4B40-81F5-9E42679AB802}" type="datetimeFigureOut">
               <a:rPr lang="en-GB" smtClean="0"/>
-              <a:t>05/02/2025</a:t>
+              <a:t>12/04/2025</a:t>
             </a:fld>
             <a:endParaRPr lang="en-GB"/>
           </a:p>
@@ -2401,7 +2840,7 @@
           <a:p>
             <a:fld id="{19CC63F1-1467-4B40-81F5-9E42679AB802}" type="datetimeFigureOut">
               <a:rPr lang="en-GB" smtClean="0"/>
-              <a:t>05/02/2025</a:t>
+              <a:t>12/04/2025</a:t>
             </a:fld>
             <a:endParaRPr lang="en-GB"/>
           </a:p>
@@ -2690,7 +3129,7 @@
           <a:p>
             <a:fld id="{19CC63F1-1467-4B40-81F5-9E42679AB802}" type="datetimeFigureOut">
               <a:rPr lang="en-GB" smtClean="0"/>
-              <a:t>05/02/2025</a:t>
+              <a:t>12/04/2025</a:t>
             </a:fld>
             <a:endParaRPr lang="en-GB"/>
           </a:p>
@@ -2933,7 +3372,7 @@
           <a:p>
             <a:fld id="{19CC63F1-1467-4B40-81F5-9E42679AB802}" type="datetimeFigureOut">
               <a:rPr lang="en-GB" smtClean="0"/>
-              <a:t>05/02/2025</a:t>
+              <a:t>12/04/2025</a:t>
             </a:fld>
             <a:endParaRPr lang="en-GB"/>
           </a:p>
@@ -4170,6 +4609,3760 @@
   <p:cSld>
     <p:spTree>
       <p:nvGrpSpPr>
+        <p:cNvPr id="1" name="">
+          <a:extLst>
+            <a:ext uri="{FF2B5EF4-FFF2-40B4-BE49-F238E27FC236}">
+              <a16:creationId xmlns:a16="http://schemas.microsoft.com/office/drawing/2014/main" id="{66EDDD41-0EE2-A8BB-ACD0-F9D7A3A60B4C}"/>
+            </a:ext>
+          </a:extLst>
+        </p:cNvPr>
+        <p:cNvGrpSpPr/>
+        <p:nvPr/>
+      </p:nvGrpSpPr>
+      <p:grpSpPr>
+        <a:xfrm>
+          <a:off x="0" y="0"/>
+          <a:ext cx="0" cy="0"/>
+          <a:chOff x="0" y="0"/>
+          <a:chExt cx="0" cy="0"/>
+        </a:xfrm>
+      </p:grpSpPr>
+      <p:sp>
+        <p:nvSpPr>
+          <p:cNvPr id="6" name="Rectangle 5">
+            <a:extLst>
+              <a:ext uri="{FF2B5EF4-FFF2-40B4-BE49-F238E27FC236}">
+                <a16:creationId xmlns:a16="http://schemas.microsoft.com/office/drawing/2014/main" id="{4C0F7535-9FED-AE28-8FD8-277BDCA4DA0C}"/>
+              </a:ext>
+            </a:extLst>
+          </p:cNvPr>
+          <p:cNvSpPr/>
+          <p:nvPr/>
+        </p:nvSpPr>
+        <p:spPr>
+          <a:xfrm>
+            <a:off x="516835" y="1690688"/>
+            <a:ext cx="4684643" cy="4810539"/>
+          </a:xfrm>
+          <a:prstGeom prst="rect">
+            <a:avLst/>
+          </a:prstGeom>
+          <a:solidFill>
+            <a:srgbClr val="A9C0D5"/>
+          </a:solidFill>
+          <a:ln>
+            <a:noFill/>
+          </a:ln>
+        </p:spPr>
+        <p:style>
+          <a:lnRef idx="2">
+            <a:schemeClr val="accent1">
+              <a:shade val="15000"/>
+            </a:schemeClr>
+          </a:lnRef>
+          <a:fillRef idx="1">
+            <a:schemeClr val="accent1"/>
+          </a:fillRef>
+          <a:effectRef idx="0">
+            <a:schemeClr val="accent1"/>
+          </a:effectRef>
+          <a:fontRef idx="minor">
+            <a:schemeClr val="lt1"/>
+          </a:fontRef>
+        </p:style>
+        <p:txBody>
+          <a:bodyPr rtlCol="0" anchor="ctr"/>
+          <a:lstStyle/>
+          <a:p>
+            <a:pPr algn="ctr"/>
+            <a:endParaRPr lang="en-GB"/>
+          </a:p>
+        </p:txBody>
+      </p:sp>
+      <p:sp>
+        <p:nvSpPr>
+          <p:cNvPr id="7" name="Rectangle 6">
+            <a:extLst>
+              <a:ext uri="{FF2B5EF4-FFF2-40B4-BE49-F238E27FC236}">
+                <a16:creationId xmlns:a16="http://schemas.microsoft.com/office/drawing/2014/main" id="{73EE0150-F1C3-3CEE-37CB-8AB114D2DD34}"/>
+              </a:ext>
+            </a:extLst>
+          </p:cNvPr>
+          <p:cNvSpPr/>
+          <p:nvPr/>
+        </p:nvSpPr>
+        <p:spPr>
+          <a:xfrm>
+            <a:off x="6937513" y="1682336"/>
+            <a:ext cx="4684643" cy="4810539"/>
+          </a:xfrm>
+          <a:prstGeom prst="rect">
+            <a:avLst/>
+          </a:prstGeom>
+          <a:solidFill>
+            <a:srgbClr val="8794B5"/>
+          </a:solidFill>
+          <a:ln>
+            <a:noFill/>
+          </a:ln>
+        </p:spPr>
+        <p:style>
+          <a:lnRef idx="2">
+            <a:schemeClr val="accent1">
+              <a:shade val="15000"/>
+            </a:schemeClr>
+          </a:lnRef>
+          <a:fillRef idx="1">
+            <a:schemeClr val="accent1"/>
+          </a:fillRef>
+          <a:effectRef idx="0">
+            <a:schemeClr val="accent1"/>
+          </a:effectRef>
+          <a:fontRef idx="minor">
+            <a:schemeClr val="lt1"/>
+          </a:fontRef>
+        </p:style>
+        <p:txBody>
+          <a:bodyPr rtlCol="0" anchor="ctr"/>
+          <a:lstStyle/>
+          <a:p>
+            <a:pPr algn="ctr"/>
+            <a:endParaRPr lang="en-GB"/>
+          </a:p>
+        </p:txBody>
+      </p:sp>
+      <p:sp>
+        <p:nvSpPr>
+          <p:cNvPr id="8" name="TextBox 7">
+            <a:extLst>
+              <a:ext uri="{FF2B5EF4-FFF2-40B4-BE49-F238E27FC236}">
+                <a16:creationId xmlns:a16="http://schemas.microsoft.com/office/drawing/2014/main" id="{A9600E01-2BC3-223D-089D-72560A9D0DF6}"/>
+              </a:ext>
+            </a:extLst>
+          </p:cNvPr>
+          <p:cNvSpPr txBox="1"/>
+          <p:nvPr/>
+        </p:nvSpPr>
+        <p:spPr>
+          <a:xfrm>
+            <a:off x="1530626" y="1762539"/>
+            <a:ext cx="2657061" cy="369332"/>
+          </a:xfrm>
+          <a:prstGeom prst="rect">
+            <a:avLst/>
+          </a:prstGeom>
+          <a:noFill/>
+        </p:spPr>
+        <p:txBody>
+          <a:bodyPr wrap="square" rtlCol="0">
+            <a:spAutoFit/>
+          </a:bodyPr>
+          <a:lstStyle/>
+          <a:p>
+            <a:r>
+              <a:rPr lang="en-GB" dirty="0"/>
+              <a:t>Local Machine / R studio</a:t>
+            </a:r>
+          </a:p>
+        </p:txBody>
+      </p:sp>
+      <p:sp>
+        <p:nvSpPr>
+          <p:cNvPr id="10" name="TextBox 9">
+            <a:extLst>
+              <a:ext uri="{FF2B5EF4-FFF2-40B4-BE49-F238E27FC236}">
+                <a16:creationId xmlns:a16="http://schemas.microsoft.com/office/drawing/2014/main" id="{6395DBFB-1EF5-64D1-CED6-B48B42759B3E}"/>
+              </a:ext>
+            </a:extLst>
+          </p:cNvPr>
+          <p:cNvSpPr txBox="1"/>
+          <p:nvPr/>
+        </p:nvSpPr>
+        <p:spPr>
+          <a:xfrm>
+            <a:off x="8640416" y="1762539"/>
+            <a:ext cx="1278836" cy="369332"/>
+          </a:xfrm>
+          <a:prstGeom prst="rect">
+            <a:avLst/>
+          </a:prstGeom>
+          <a:noFill/>
+        </p:spPr>
+        <p:txBody>
+          <a:bodyPr wrap="square" rtlCol="0">
+            <a:spAutoFit/>
+          </a:bodyPr>
+          <a:lstStyle/>
+          <a:p>
+            <a:r>
+              <a:rPr lang="en-GB" dirty="0"/>
+              <a:t>SCW hawk</a:t>
+            </a:r>
+          </a:p>
+        </p:txBody>
+      </p:sp>
+      <p:sp>
+        <p:nvSpPr>
+          <p:cNvPr id="11" name="Rectangle: Rounded Corners 10">
+            <a:extLst>
+              <a:ext uri="{FF2B5EF4-FFF2-40B4-BE49-F238E27FC236}">
+                <a16:creationId xmlns:a16="http://schemas.microsoft.com/office/drawing/2014/main" id="{7CBBA389-C14D-D7C9-FD6C-65F7C75B4D91}"/>
+              </a:ext>
+            </a:extLst>
+          </p:cNvPr>
+          <p:cNvSpPr/>
+          <p:nvPr/>
+        </p:nvSpPr>
+        <p:spPr>
+          <a:xfrm>
+            <a:off x="6000611" y="243364"/>
+            <a:ext cx="821634" cy="287545"/>
+          </a:xfrm>
+          <a:prstGeom prst="roundRect">
+            <a:avLst/>
+          </a:prstGeom>
+        </p:spPr>
+        <p:style>
+          <a:lnRef idx="2">
+            <a:schemeClr val="accent1">
+              <a:shade val="15000"/>
+            </a:schemeClr>
+          </a:lnRef>
+          <a:fillRef idx="1">
+            <a:schemeClr val="accent1"/>
+          </a:fillRef>
+          <a:effectRef idx="0">
+            <a:schemeClr val="accent1"/>
+          </a:effectRef>
+          <a:fontRef idx="minor">
+            <a:schemeClr val="lt1"/>
+          </a:fontRef>
+        </p:style>
+        <p:txBody>
+          <a:bodyPr rtlCol="0" anchor="ctr"/>
+          <a:lstStyle/>
+          <a:p>
+            <a:pPr algn="ctr"/>
+            <a:r>
+              <a:rPr lang="en-GB" sz="1200" dirty="0"/>
+              <a:t>Script</a:t>
+            </a:r>
+          </a:p>
+        </p:txBody>
+      </p:sp>
+      <p:sp>
+        <p:nvSpPr>
+          <p:cNvPr id="13" name="Oval 12">
+            <a:extLst>
+              <a:ext uri="{FF2B5EF4-FFF2-40B4-BE49-F238E27FC236}">
+                <a16:creationId xmlns:a16="http://schemas.microsoft.com/office/drawing/2014/main" id="{FEADAEE6-19C9-ED1F-B59A-4B831A11AA8A}"/>
+              </a:ext>
+            </a:extLst>
+          </p:cNvPr>
+          <p:cNvSpPr/>
+          <p:nvPr/>
+        </p:nvSpPr>
+        <p:spPr>
+          <a:xfrm>
+            <a:off x="8892896" y="243364"/>
+            <a:ext cx="1013792" cy="321987"/>
+          </a:xfrm>
+          <a:prstGeom prst="ellipse">
+            <a:avLst/>
+          </a:prstGeom>
+        </p:spPr>
+        <p:style>
+          <a:lnRef idx="2">
+            <a:schemeClr val="accent1">
+              <a:shade val="15000"/>
+            </a:schemeClr>
+          </a:lnRef>
+          <a:fillRef idx="1">
+            <a:schemeClr val="accent1"/>
+          </a:fillRef>
+          <a:effectRef idx="0">
+            <a:schemeClr val="accent1"/>
+          </a:effectRef>
+          <a:fontRef idx="minor">
+            <a:schemeClr val="lt1"/>
+          </a:fontRef>
+        </p:style>
+        <p:txBody>
+          <a:bodyPr rtlCol="0" anchor="ctr"/>
+          <a:lstStyle/>
+          <a:p>
+            <a:pPr algn="ctr"/>
+            <a:r>
+              <a:rPr lang="en-GB" sz="1200" dirty="0"/>
+              <a:t>process</a:t>
+            </a:r>
+          </a:p>
+        </p:txBody>
+      </p:sp>
+      <p:sp>
+        <p:nvSpPr>
+          <p:cNvPr id="14" name="Rectangle: Rounded Corners 13">
+            <a:extLst>
+              <a:ext uri="{FF2B5EF4-FFF2-40B4-BE49-F238E27FC236}">
+                <a16:creationId xmlns:a16="http://schemas.microsoft.com/office/drawing/2014/main" id="{46D9D67C-9531-5AF4-0FF5-81B402912FDB}"/>
+              </a:ext>
+            </a:extLst>
+          </p:cNvPr>
+          <p:cNvSpPr/>
+          <p:nvPr/>
+        </p:nvSpPr>
+        <p:spPr>
+          <a:xfrm>
+            <a:off x="3296882" y="2268812"/>
+            <a:ext cx="1638583" cy="448229"/>
+          </a:xfrm>
+          <a:prstGeom prst="roundRect">
+            <a:avLst/>
+          </a:prstGeom>
+        </p:spPr>
+        <p:style>
+          <a:lnRef idx="2">
+            <a:schemeClr val="accent1">
+              <a:shade val="15000"/>
+            </a:schemeClr>
+          </a:lnRef>
+          <a:fillRef idx="1">
+            <a:schemeClr val="accent1"/>
+          </a:fillRef>
+          <a:effectRef idx="0">
+            <a:schemeClr val="accent1"/>
+          </a:effectRef>
+          <a:fontRef idx="minor">
+            <a:schemeClr val="lt1"/>
+          </a:fontRef>
+        </p:style>
+        <p:txBody>
+          <a:bodyPr rtlCol="0" anchor="ctr"/>
+          <a:lstStyle/>
+          <a:p>
+            <a:pPr algn="ctr"/>
+            <a:r>
+              <a:rPr lang="en-GB" sz="1200" dirty="0" err="1"/>
+              <a:t>NCBIfastacollector.R</a:t>
+            </a:r>
+            <a:endParaRPr lang="en-GB" sz="1200" dirty="0"/>
+          </a:p>
+        </p:txBody>
+      </p:sp>
+      <p:grpSp>
+        <p:nvGrpSpPr>
+          <p:cNvPr id="17" name="Group 16">
+            <a:extLst>
+              <a:ext uri="{FF2B5EF4-FFF2-40B4-BE49-F238E27FC236}">
+                <a16:creationId xmlns:a16="http://schemas.microsoft.com/office/drawing/2014/main" id="{BA188B10-5CD7-FC05-2BF0-0DC8B13A6308}"/>
+              </a:ext>
+            </a:extLst>
+          </p:cNvPr>
+          <p:cNvGrpSpPr/>
+          <p:nvPr/>
+        </p:nvGrpSpPr>
+        <p:grpSpPr>
+          <a:xfrm>
+            <a:off x="838200" y="416117"/>
+            <a:ext cx="1736035" cy="481876"/>
+            <a:chOff x="5201478" y="955985"/>
+            <a:chExt cx="1736035" cy="481876"/>
+          </a:xfrm>
+        </p:grpSpPr>
+        <p:sp>
+          <p:nvSpPr>
+            <p:cNvPr id="15" name="Rectangle 14">
+              <a:extLst>
+                <a:ext uri="{FF2B5EF4-FFF2-40B4-BE49-F238E27FC236}">
+                  <a16:creationId xmlns:a16="http://schemas.microsoft.com/office/drawing/2014/main" id="{601532F5-F470-DC5F-2E04-45FBA90B96B7}"/>
+                </a:ext>
+              </a:extLst>
+            </p:cNvPr>
+            <p:cNvSpPr/>
+            <p:nvPr/>
+          </p:nvSpPr>
+          <p:spPr>
+            <a:xfrm>
+              <a:off x="5201478" y="955985"/>
+              <a:ext cx="1736035" cy="481876"/>
+            </a:xfrm>
+            <a:prstGeom prst="rect">
+              <a:avLst/>
+            </a:prstGeom>
+            <a:solidFill>
+              <a:schemeClr val="accent3">
+                <a:lumMod val="40000"/>
+                <a:lumOff val="60000"/>
+              </a:schemeClr>
+            </a:solidFill>
+            <a:ln>
+              <a:noFill/>
+            </a:ln>
+          </p:spPr>
+          <p:style>
+            <a:lnRef idx="2">
+              <a:schemeClr val="accent1">
+                <a:shade val="15000"/>
+              </a:schemeClr>
+            </a:lnRef>
+            <a:fillRef idx="1">
+              <a:schemeClr val="accent1"/>
+            </a:fillRef>
+            <a:effectRef idx="0">
+              <a:schemeClr val="accent1"/>
+            </a:effectRef>
+            <a:fontRef idx="minor">
+              <a:schemeClr val="lt1"/>
+            </a:fontRef>
+          </p:style>
+          <p:txBody>
+            <a:bodyPr rtlCol="0" anchor="ctr"/>
+            <a:lstStyle/>
+            <a:p>
+              <a:pPr algn="ctr"/>
+              <a:endParaRPr lang="en-GB"/>
+            </a:p>
+          </p:txBody>
+        </p:sp>
+        <p:sp>
+          <p:nvSpPr>
+            <p:cNvPr id="16" name="TextBox 15">
+              <a:extLst>
+                <a:ext uri="{FF2B5EF4-FFF2-40B4-BE49-F238E27FC236}">
+                  <a16:creationId xmlns:a16="http://schemas.microsoft.com/office/drawing/2014/main" id="{6C33FDC1-B4C6-AE71-D5A3-4E1AF5137ED4}"/>
+                </a:ext>
+              </a:extLst>
+            </p:cNvPr>
+            <p:cNvSpPr txBox="1"/>
+            <p:nvPr/>
+          </p:nvSpPr>
+          <p:spPr>
+            <a:xfrm>
+              <a:off x="5267738" y="1001925"/>
+              <a:ext cx="1603514" cy="369332"/>
+            </a:xfrm>
+            <a:prstGeom prst="rect">
+              <a:avLst/>
+            </a:prstGeom>
+            <a:noFill/>
+          </p:spPr>
+          <p:txBody>
+            <a:bodyPr wrap="square" rtlCol="0">
+              <a:spAutoFit/>
+            </a:bodyPr>
+            <a:lstStyle/>
+            <a:p>
+              <a:r>
+                <a:rPr lang="en-GB" dirty="0"/>
+                <a:t>NCBI website</a:t>
+              </a:r>
+            </a:p>
+          </p:txBody>
+        </p:sp>
+      </p:grpSp>
+      <p:cxnSp>
+        <p:nvCxnSpPr>
+          <p:cNvPr id="18" name="Straight Arrow Connector 17">
+            <a:extLst>
+              <a:ext uri="{FF2B5EF4-FFF2-40B4-BE49-F238E27FC236}">
+                <a16:creationId xmlns:a16="http://schemas.microsoft.com/office/drawing/2014/main" id="{5C2B9565-04B2-BFF8-2B2C-5F3876B5BCBB}"/>
+              </a:ext>
+            </a:extLst>
+          </p:cNvPr>
+          <p:cNvCxnSpPr>
+            <a:stCxn id="14" idx="0"/>
+            <a:endCxn id="16" idx="2"/>
+          </p:cNvCxnSpPr>
+          <p:nvPr/>
+        </p:nvCxnSpPr>
+        <p:spPr>
+          <a:xfrm flipH="1" flipV="1">
+            <a:off x="1706217" y="831389"/>
+            <a:ext cx="2409957" cy="1437423"/>
+          </a:xfrm>
+          <a:prstGeom prst="straightConnector1">
+            <a:avLst/>
+          </a:prstGeom>
+          <a:ln>
+            <a:tailEnd type="triangle"/>
+          </a:ln>
+        </p:spPr>
+        <p:style>
+          <a:lnRef idx="2">
+            <a:schemeClr val="dk1"/>
+          </a:lnRef>
+          <a:fillRef idx="0">
+            <a:schemeClr val="dk1"/>
+          </a:fillRef>
+          <a:effectRef idx="1">
+            <a:schemeClr val="dk1"/>
+          </a:effectRef>
+          <a:fontRef idx="minor">
+            <a:schemeClr val="tx1"/>
+          </a:fontRef>
+        </p:style>
+      </p:cxnSp>
+      <p:sp>
+        <p:nvSpPr>
+          <p:cNvPr id="19" name="Oval 18">
+            <a:extLst>
+              <a:ext uri="{FF2B5EF4-FFF2-40B4-BE49-F238E27FC236}">
+                <a16:creationId xmlns:a16="http://schemas.microsoft.com/office/drawing/2014/main" id="{1B27DE42-D782-FCDF-75ED-0D05935816AB}"/>
+              </a:ext>
+            </a:extLst>
+          </p:cNvPr>
+          <p:cNvSpPr/>
+          <p:nvPr/>
+        </p:nvSpPr>
+        <p:spPr>
+          <a:xfrm>
+            <a:off x="4548807" y="1330773"/>
+            <a:ext cx="1013792" cy="321987"/>
+          </a:xfrm>
+          <a:prstGeom prst="ellipse">
+            <a:avLst/>
+          </a:prstGeom>
+        </p:spPr>
+        <p:style>
+          <a:lnRef idx="2">
+            <a:schemeClr val="accent1">
+              <a:shade val="15000"/>
+            </a:schemeClr>
+          </a:lnRef>
+          <a:fillRef idx="1">
+            <a:schemeClr val="accent1"/>
+          </a:fillRef>
+          <a:effectRef idx="0">
+            <a:schemeClr val="accent1"/>
+          </a:effectRef>
+          <a:fontRef idx="minor">
+            <a:schemeClr val="lt1"/>
+          </a:fontRef>
+        </p:style>
+        <p:txBody>
+          <a:bodyPr rtlCol="0" anchor="ctr"/>
+          <a:lstStyle/>
+          <a:p>
+            <a:pPr algn="ctr"/>
+            <a:r>
+              <a:rPr lang="en-GB" sz="1200" dirty="0"/>
+              <a:t>API call</a:t>
+            </a:r>
+          </a:p>
+        </p:txBody>
+      </p:sp>
+      <p:sp>
+        <p:nvSpPr>
+          <p:cNvPr id="20" name="Rectangle: Rounded Corners 19">
+            <a:extLst>
+              <a:ext uri="{FF2B5EF4-FFF2-40B4-BE49-F238E27FC236}">
+                <a16:creationId xmlns:a16="http://schemas.microsoft.com/office/drawing/2014/main" id="{147486E8-9F0E-9F69-DAB7-CC60C8CD3BE3}"/>
+              </a:ext>
+            </a:extLst>
+          </p:cNvPr>
+          <p:cNvSpPr/>
+          <p:nvPr/>
+        </p:nvSpPr>
+        <p:spPr>
+          <a:xfrm>
+            <a:off x="784625" y="2268812"/>
+            <a:ext cx="1219483" cy="448229"/>
+          </a:xfrm>
+          <a:prstGeom prst="roundRect">
+            <a:avLst/>
+          </a:prstGeom>
+        </p:spPr>
+        <p:style>
+          <a:lnRef idx="2">
+            <a:schemeClr val="accent1">
+              <a:shade val="15000"/>
+            </a:schemeClr>
+          </a:lnRef>
+          <a:fillRef idx="1">
+            <a:schemeClr val="accent1"/>
+          </a:fillRef>
+          <a:effectRef idx="0">
+            <a:schemeClr val="accent1"/>
+          </a:effectRef>
+          <a:fontRef idx="minor">
+            <a:schemeClr val="lt1"/>
+          </a:fontRef>
+        </p:style>
+        <p:txBody>
+          <a:bodyPr rtlCol="0" anchor="ctr"/>
+          <a:lstStyle/>
+          <a:p>
+            <a:pPr algn="ctr"/>
+            <a:r>
+              <a:rPr lang="en-GB" sz="1200" dirty="0" err="1"/>
+              <a:t>NCBImetadatacollector.R</a:t>
+            </a:r>
+            <a:endParaRPr lang="en-GB" sz="1200" dirty="0"/>
+          </a:p>
+        </p:txBody>
+      </p:sp>
+      <p:cxnSp>
+        <p:nvCxnSpPr>
+          <p:cNvPr id="22" name="Connector: Curved 21">
+            <a:extLst>
+              <a:ext uri="{FF2B5EF4-FFF2-40B4-BE49-F238E27FC236}">
+                <a16:creationId xmlns:a16="http://schemas.microsoft.com/office/drawing/2014/main" id="{DE6AF9BA-78BA-2A40-30D9-3CC57188CBB0}"/>
+              </a:ext>
+            </a:extLst>
+          </p:cNvPr>
+          <p:cNvCxnSpPr>
+            <a:cxnSpLocks/>
+            <a:stCxn id="20" idx="0"/>
+            <a:endCxn id="15" idx="1"/>
+          </p:cNvCxnSpPr>
+          <p:nvPr/>
+        </p:nvCxnSpPr>
+        <p:spPr>
+          <a:xfrm rot="16200000" flipV="1">
+            <a:off x="310406" y="1184850"/>
+            <a:ext cx="1611757" cy="556167"/>
+          </a:xfrm>
+          <a:prstGeom prst="curvedConnector4">
+            <a:avLst>
+              <a:gd name="adj1" fmla="val 42526"/>
+              <a:gd name="adj2" fmla="val 150736"/>
+            </a:avLst>
+          </a:prstGeom>
+          <a:ln>
+            <a:tailEnd type="triangle"/>
+          </a:ln>
+        </p:spPr>
+        <p:style>
+          <a:lnRef idx="2">
+            <a:schemeClr val="dk1"/>
+          </a:lnRef>
+          <a:fillRef idx="0">
+            <a:schemeClr val="dk1"/>
+          </a:fillRef>
+          <a:effectRef idx="1">
+            <a:schemeClr val="dk1"/>
+          </a:effectRef>
+          <a:fontRef idx="minor">
+            <a:schemeClr val="tx1"/>
+          </a:fontRef>
+        </p:style>
+      </p:cxnSp>
+      <p:cxnSp>
+        <p:nvCxnSpPr>
+          <p:cNvPr id="37" name="Straight Arrow Connector 36">
+            <a:extLst>
+              <a:ext uri="{FF2B5EF4-FFF2-40B4-BE49-F238E27FC236}">
+                <a16:creationId xmlns:a16="http://schemas.microsoft.com/office/drawing/2014/main" id="{C60A2EE3-6A29-BC1A-721C-E36BC07F6BB3}"/>
+              </a:ext>
+            </a:extLst>
+          </p:cNvPr>
+          <p:cNvCxnSpPr>
+            <a:cxnSpLocks/>
+            <a:stCxn id="14" idx="2"/>
+            <a:endCxn id="54" idx="3"/>
+          </p:cNvCxnSpPr>
+          <p:nvPr/>
+        </p:nvCxnSpPr>
+        <p:spPr>
+          <a:xfrm>
+            <a:off x="4116174" y="2717041"/>
+            <a:ext cx="37130" cy="237772"/>
+          </a:xfrm>
+          <a:prstGeom prst="straightConnector1">
+            <a:avLst/>
+          </a:prstGeom>
+          <a:ln>
+            <a:tailEnd type="triangle"/>
+          </a:ln>
+        </p:spPr>
+        <p:style>
+          <a:lnRef idx="2">
+            <a:schemeClr val="dk1"/>
+          </a:lnRef>
+          <a:fillRef idx="0">
+            <a:schemeClr val="dk1"/>
+          </a:fillRef>
+          <a:effectRef idx="1">
+            <a:schemeClr val="dk1"/>
+          </a:effectRef>
+          <a:fontRef idx="minor">
+            <a:schemeClr val="tx1"/>
+          </a:fontRef>
+        </p:style>
+      </p:cxnSp>
+      <p:cxnSp>
+        <p:nvCxnSpPr>
+          <p:cNvPr id="40" name="Straight Arrow Connector 39">
+            <a:extLst>
+              <a:ext uri="{FF2B5EF4-FFF2-40B4-BE49-F238E27FC236}">
+                <a16:creationId xmlns:a16="http://schemas.microsoft.com/office/drawing/2014/main" id="{BA6197EC-8935-F863-7E03-78E31E69F7F7}"/>
+              </a:ext>
+            </a:extLst>
+          </p:cNvPr>
+          <p:cNvCxnSpPr>
+            <a:cxnSpLocks/>
+            <a:stCxn id="20" idx="2"/>
+            <a:endCxn id="55" idx="3"/>
+          </p:cNvCxnSpPr>
+          <p:nvPr/>
+        </p:nvCxnSpPr>
+        <p:spPr>
+          <a:xfrm>
+            <a:off x="1394367" y="2717041"/>
+            <a:ext cx="209550" cy="319431"/>
+          </a:xfrm>
+          <a:prstGeom prst="straightConnector1">
+            <a:avLst/>
+          </a:prstGeom>
+          <a:ln>
+            <a:tailEnd type="triangle"/>
+          </a:ln>
+        </p:spPr>
+        <p:style>
+          <a:lnRef idx="2">
+            <a:schemeClr val="dk1"/>
+          </a:lnRef>
+          <a:fillRef idx="0">
+            <a:schemeClr val="dk1"/>
+          </a:fillRef>
+          <a:effectRef idx="1">
+            <a:schemeClr val="dk1"/>
+          </a:effectRef>
+          <a:fontRef idx="minor">
+            <a:schemeClr val="tx1"/>
+          </a:fontRef>
+        </p:style>
+      </p:cxnSp>
+      <p:cxnSp>
+        <p:nvCxnSpPr>
+          <p:cNvPr id="43" name="Straight Arrow Connector 42">
+            <a:extLst>
+              <a:ext uri="{FF2B5EF4-FFF2-40B4-BE49-F238E27FC236}">
+                <a16:creationId xmlns:a16="http://schemas.microsoft.com/office/drawing/2014/main" id="{AAD89BEB-9407-9AC5-6E07-656CDC1DAA6A}"/>
+              </a:ext>
+            </a:extLst>
+          </p:cNvPr>
+          <p:cNvCxnSpPr>
+            <a:cxnSpLocks/>
+            <a:stCxn id="54" idx="0"/>
+            <a:endCxn id="48" idx="2"/>
+          </p:cNvCxnSpPr>
+          <p:nvPr/>
+        </p:nvCxnSpPr>
+        <p:spPr>
+          <a:xfrm flipV="1">
+            <a:off x="5009725" y="2708341"/>
+            <a:ext cx="2424745" cy="409243"/>
+          </a:xfrm>
+          <a:prstGeom prst="straightConnector1">
+            <a:avLst/>
+          </a:prstGeom>
+          <a:ln>
+            <a:tailEnd type="triangle"/>
+          </a:ln>
+        </p:spPr>
+        <p:style>
+          <a:lnRef idx="2">
+            <a:schemeClr val="dk1"/>
+          </a:lnRef>
+          <a:fillRef idx="0">
+            <a:schemeClr val="dk1"/>
+          </a:fillRef>
+          <a:effectRef idx="1">
+            <a:schemeClr val="dk1"/>
+          </a:effectRef>
+          <a:fontRef idx="minor">
+            <a:schemeClr val="tx1"/>
+          </a:fontRef>
+        </p:style>
+      </p:cxnSp>
+      <p:sp>
+        <p:nvSpPr>
+          <p:cNvPr id="47" name="Rectangle: Single Corner Snipped 46">
+            <a:extLst>
+              <a:ext uri="{FF2B5EF4-FFF2-40B4-BE49-F238E27FC236}">
+                <a16:creationId xmlns:a16="http://schemas.microsoft.com/office/drawing/2014/main" id="{E2718566-A121-D8B8-DA94-6353D9192F22}"/>
+              </a:ext>
+            </a:extLst>
+          </p:cNvPr>
+          <p:cNvSpPr/>
+          <p:nvPr/>
+        </p:nvSpPr>
+        <p:spPr>
+          <a:xfrm>
+            <a:off x="7345706" y="243364"/>
+            <a:ext cx="993915" cy="287545"/>
+          </a:xfrm>
+          <a:prstGeom prst="snip1Rect">
+            <a:avLst>
+              <a:gd name="adj" fmla="val 50000"/>
+            </a:avLst>
+          </a:prstGeom>
+        </p:spPr>
+        <p:style>
+          <a:lnRef idx="2">
+            <a:schemeClr val="accent1">
+              <a:shade val="15000"/>
+            </a:schemeClr>
+          </a:lnRef>
+          <a:fillRef idx="1">
+            <a:schemeClr val="accent1"/>
+          </a:fillRef>
+          <a:effectRef idx="0">
+            <a:schemeClr val="accent1"/>
+          </a:effectRef>
+          <a:fontRef idx="minor">
+            <a:schemeClr val="lt1"/>
+          </a:fontRef>
+        </p:style>
+        <p:txBody>
+          <a:bodyPr rtlCol="0" anchor="ctr"/>
+          <a:lstStyle/>
+          <a:p>
+            <a:pPr algn="ctr"/>
+            <a:r>
+              <a:rPr lang="en-GB" sz="1200" dirty="0"/>
+              <a:t>folder</a:t>
+            </a:r>
+          </a:p>
+        </p:txBody>
+      </p:sp>
+      <p:sp>
+        <p:nvSpPr>
+          <p:cNvPr id="48" name="Rectangle: Single Corner Snipped 47">
+            <a:extLst>
+              <a:ext uri="{FF2B5EF4-FFF2-40B4-BE49-F238E27FC236}">
+                <a16:creationId xmlns:a16="http://schemas.microsoft.com/office/drawing/2014/main" id="{8F5AE4AD-98B2-6ED3-25E2-48ED69440A34}"/>
+              </a:ext>
+            </a:extLst>
+          </p:cNvPr>
+          <p:cNvSpPr/>
+          <p:nvPr/>
+        </p:nvSpPr>
+        <p:spPr>
+          <a:xfrm>
+            <a:off x="7434470" y="2564568"/>
+            <a:ext cx="993915" cy="287545"/>
+          </a:xfrm>
+          <a:prstGeom prst="snip1Rect">
+            <a:avLst>
+              <a:gd name="adj" fmla="val 50000"/>
+            </a:avLst>
+          </a:prstGeom>
+        </p:spPr>
+        <p:style>
+          <a:lnRef idx="2">
+            <a:schemeClr val="accent1">
+              <a:shade val="15000"/>
+            </a:schemeClr>
+          </a:lnRef>
+          <a:fillRef idx="1">
+            <a:schemeClr val="accent1"/>
+          </a:fillRef>
+          <a:effectRef idx="0">
+            <a:schemeClr val="accent1"/>
+          </a:effectRef>
+          <a:fontRef idx="minor">
+            <a:schemeClr val="lt1"/>
+          </a:fontRef>
+        </p:style>
+        <p:txBody>
+          <a:bodyPr rtlCol="0" anchor="ctr"/>
+          <a:lstStyle/>
+          <a:p>
+            <a:pPr algn="ctr"/>
+            <a:r>
+              <a:rPr lang="en-GB" sz="1200" dirty="0" err="1"/>
+              <a:t>Fasta_files</a:t>
+            </a:r>
+            <a:endParaRPr lang="en-GB" sz="1200" dirty="0"/>
+          </a:p>
+        </p:txBody>
+      </p:sp>
+      <p:sp>
+        <p:nvSpPr>
+          <p:cNvPr id="54" name="Rectangle: Single Corner Snipped 53">
+            <a:extLst>
+              <a:ext uri="{FF2B5EF4-FFF2-40B4-BE49-F238E27FC236}">
+                <a16:creationId xmlns:a16="http://schemas.microsoft.com/office/drawing/2014/main" id="{54CF5EC7-B077-145F-ED5E-2AEA41777FD4}"/>
+              </a:ext>
+            </a:extLst>
+          </p:cNvPr>
+          <p:cNvSpPr/>
+          <p:nvPr/>
+        </p:nvSpPr>
+        <p:spPr>
+          <a:xfrm>
+            <a:off x="3296882" y="2954813"/>
+            <a:ext cx="1712843" cy="325541"/>
+          </a:xfrm>
+          <a:prstGeom prst="snip1Rect">
+            <a:avLst>
+              <a:gd name="adj" fmla="val 50000"/>
+            </a:avLst>
+          </a:prstGeom>
+        </p:spPr>
+        <p:style>
+          <a:lnRef idx="2">
+            <a:schemeClr val="accent1">
+              <a:shade val="15000"/>
+            </a:schemeClr>
+          </a:lnRef>
+          <a:fillRef idx="1">
+            <a:schemeClr val="accent1"/>
+          </a:fillRef>
+          <a:effectRef idx="0">
+            <a:schemeClr val="accent1"/>
+          </a:effectRef>
+          <a:fontRef idx="minor">
+            <a:schemeClr val="lt1"/>
+          </a:fontRef>
+        </p:style>
+        <p:txBody>
+          <a:bodyPr rtlCol="0" anchor="ctr"/>
+          <a:lstStyle/>
+          <a:p>
+            <a:pPr algn="ctr"/>
+            <a:r>
+              <a:rPr lang="en-GB" sz="1200" dirty="0"/>
+              <a:t>02…/</a:t>
+            </a:r>
+            <a:r>
+              <a:rPr lang="en-GB" sz="1200" dirty="0" err="1"/>
+              <a:t>ncbi_stuff</a:t>
+            </a:r>
+            <a:r>
+              <a:rPr lang="en-GB" sz="1200" dirty="0"/>
+              <a:t>/</a:t>
+            </a:r>
+            <a:r>
+              <a:rPr lang="en-GB" sz="1200" dirty="0" err="1"/>
+              <a:t>fasta</a:t>
+            </a:r>
+            <a:endParaRPr lang="en-GB" sz="1200" dirty="0"/>
+          </a:p>
+        </p:txBody>
+      </p:sp>
+      <p:sp>
+        <p:nvSpPr>
+          <p:cNvPr id="55" name="Rectangle: Single Corner Snipped 54">
+            <a:extLst>
+              <a:ext uri="{FF2B5EF4-FFF2-40B4-BE49-F238E27FC236}">
+                <a16:creationId xmlns:a16="http://schemas.microsoft.com/office/drawing/2014/main" id="{B582B18B-8C3A-1757-57BB-632DB8889EF6}"/>
+              </a:ext>
+            </a:extLst>
+          </p:cNvPr>
+          <p:cNvSpPr/>
+          <p:nvPr/>
+        </p:nvSpPr>
+        <p:spPr>
+          <a:xfrm>
+            <a:off x="784625" y="3036472"/>
+            <a:ext cx="1638583" cy="325541"/>
+          </a:xfrm>
+          <a:prstGeom prst="snip1Rect">
+            <a:avLst>
+              <a:gd name="adj" fmla="val 50000"/>
+            </a:avLst>
+          </a:prstGeom>
+        </p:spPr>
+        <p:style>
+          <a:lnRef idx="2">
+            <a:schemeClr val="accent1">
+              <a:shade val="15000"/>
+            </a:schemeClr>
+          </a:lnRef>
+          <a:fillRef idx="1">
+            <a:schemeClr val="accent1"/>
+          </a:fillRef>
+          <a:effectRef idx="0">
+            <a:schemeClr val="accent1"/>
+          </a:effectRef>
+          <a:fontRef idx="minor">
+            <a:schemeClr val="lt1"/>
+          </a:fontRef>
+        </p:style>
+        <p:txBody>
+          <a:bodyPr rtlCol="0" anchor="ctr"/>
+          <a:lstStyle/>
+          <a:p>
+            <a:pPr algn="ctr"/>
+            <a:r>
+              <a:rPr lang="en-GB" sz="1200" dirty="0"/>
+              <a:t>02…/</a:t>
+            </a:r>
+            <a:r>
+              <a:rPr lang="en-GB" sz="1200" dirty="0" err="1"/>
+              <a:t>ncbi_stuff</a:t>
+            </a:r>
+            <a:r>
+              <a:rPr lang="en-GB" sz="1200" dirty="0"/>
+              <a:t>/</a:t>
+            </a:r>
+            <a:r>
+              <a:rPr lang="en-GB" sz="1200" dirty="0" err="1"/>
+              <a:t>json</a:t>
+            </a:r>
+            <a:endParaRPr lang="en-GB" sz="1200" dirty="0"/>
+          </a:p>
+          <a:p>
+            <a:pPr algn="ctr"/>
+            <a:endParaRPr lang="en-GB" sz="1200" dirty="0"/>
+          </a:p>
+        </p:txBody>
+      </p:sp>
+      <p:sp>
+        <p:nvSpPr>
+          <p:cNvPr id="59" name="Oval 58">
+            <a:extLst>
+              <a:ext uri="{FF2B5EF4-FFF2-40B4-BE49-F238E27FC236}">
+                <a16:creationId xmlns:a16="http://schemas.microsoft.com/office/drawing/2014/main" id="{382D4A0A-F400-A77D-6CA5-EDC8BDF9A049}"/>
+              </a:ext>
+            </a:extLst>
+          </p:cNvPr>
+          <p:cNvSpPr/>
+          <p:nvPr/>
+        </p:nvSpPr>
+        <p:spPr>
+          <a:xfrm>
+            <a:off x="8980004" y="2492926"/>
+            <a:ext cx="1096618" cy="481703"/>
+          </a:xfrm>
+          <a:prstGeom prst="ellipse">
+            <a:avLst/>
+          </a:prstGeom>
+        </p:spPr>
+        <p:style>
+          <a:lnRef idx="2">
+            <a:schemeClr val="accent1">
+              <a:shade val="15000"/>
+            </a:schemeClr>
+          </a:lnRef>
+          <a:fillRef idx="1">
+            <a:schemeClr val="accent1"/>
+          </a:fillRef>
+          <a:effectRef idx="0">
+            <a:schemeClr val="accent1"/>
+          </a:effectRef>
+          <a:fontRef idx="minor">
+            <a:schemeClr val="lt1"/>
+          </a:fontRef>
+        </p:style>
+        <p:txBody>
+          <a:bodyPr rtlCol="0" anchor="ctr"/>
+          <a:lstStyle/>
+          <a:p>
+            <a:pPr algn="ctr"/>
+            <a:r>
+              <a:rPr lang="en-GB" sz="1200" dirty="0"/>
+              <a:t>Eggnog V2.1.12</a:t>
+            </a:r>
+          </a:p>
+        </p:txBody>
+      </p:sp>
+      <p:cxnSp>
+        <p:nvCxnSpPr>
+          <p:cNvPr id="60" name="Straight Arrow Connector 59">
+            <a:extLst>
+              <a:ext uri="{FF2B5EF4-FFF2-40B4-BE49-F238E27FC236}">
+                <a16:creationId xmlns:a16="http://schemas.microsoft.com/office/drawing/2014/main" id="{4F206621-75CF-087F-9E54-DBFA86DC498A}"/>
+              </a:ext>
+            </a:extLst>
+          </p:cNvPr>
+          <p:cNvCxnSpPr>
+            <a:cxnSpLocks/>
+            <a:stCxn id="48" idx="0"/>
+            <a:endCxn id="59" idx="2"/>
+          </p:cNvCxnSpPr>
+          <p:nvPr/>
+        </p:nvCxnSpPr>
+        <p:spPr>
+          <a:xfrm>
+            <a:off x="8428385" y="2708341"/>
+            <a:ext cx="551619" cy="25437"/>
+          </a:xfrm>
+          <a:prstGeom prst="straightConnector1">
+            <a:avLst/>
+          </a:prstGeom>
+          <a:ln>
+            <a:tailEnd type="triangle"/>
+          </a:ln>
+        </p:spPr>
+        <p:style>
+          <a:lnRef idx="2">
+            <a:schemeClr val="dk1"/>
+          </a:lnRef>
+          <a:fillRef idx="0">
+            <a:schemeClr val="dk1"/>
+          </a:fillRef>
+          <a:effectRef idx="1">
+            <a:schemeClr val="dk1"/>
+          </a:effectRef>
+          <a:fontRef idx="minor">
+            <a:schemeClr val="tx1"/>
+          </a:fontRef>
+        </p:style>
+      </p:cxnSp>
+      <p:sp>
+        <p:nvSpPr>
+          <p:cNvPr id="63" name="Rectangle: Single Corner Snipped 62">
+            <a:extLst>
+              <a:ext uri="{FF2B5EF4-FFF2-40B4-BE49-F238E27FC236}">
+                <a16:creationId xmlns:a16="http://schemas.microsoft.com/office/drawing/2014/main" id="{3CF759FC-B320-55BA-3FD3-992812276E67}"/>
+              </a:ext>
+            </a:extLst>
+          </p:cNvPr>
+          <p:cNvSpPr/>
+          <p:nvPr/>
+        </p:nvSpPr>
+        <p:spPr>
+          <a:xfrm>
+            <a:off x="8704194" y="3219105"/>
+            <a:ext cx="1656523" cy="266218"/>
+          </a:xfrm>
+          <a:prstGeom prst="snip1Rect">
+            <a:avLst>
+              <a:gd name="adj" fmla="val 50000"/>
+            </a:avLst>
+          </a:prstGeom>
+        </p:spPr>
+        <p:style>
+          <a:lnRef idx="2">
+            <a:schemeClr val="accent1">
+              <a:shade val="15000"/>
+            </a:schemeClr>
+          </a:lnRef>
+          <a:fillRef idx="1">
+            <a:schemeClr val="accent1"/>
+          </a:fillRef>
+          <a:effectRef idx="0">
+            <a:schemeClr val="accent1"/>
+          </a:effectRef>
+          <a:fontRef idx="minor">
+            <a:schemeClr val="lt1"/>
+          </a:fontRef>
+        </p:style>
+        <p:txBody>
+          <a:bodyPr rtlCol="0" anchor="ctr"/>
+          <a:lstStyle/>
+          <a:p>
+            <a:pPr algn="ctr"/>
+            <a:r>
+              <a:rPr lang="en-GB" sz="1200" dirty="0" err="1"/>
+              <a:t>eggnog_annotations</a:t>
+            </a:r>
+            <a:endParaRPr lang="en-GB" sz="1200" dirty="0"/>
+          </a:p>
+        </p:txBody>
+      </p:sp>
+      <p:cxnSp>
+        <p:nvCxnSpPr>
+          <p:cNvPr id="64" name="Straight Arrow Connector 63">
+            <a:extLst>
+              <a:ext uri="{FF2B5EF4-FFF2-40B4-BE49-F238E27FC236}">
+                <a16:creationId xmlns:a16="http://schemas.microsoft.com/office/drawing/2014/main" id="{21183FA2-C253-ADA6-4F93-E878D536A3E8}"/>
+              </a:ext>
+            </a:extLst>
+          </p:cNvPr>
+          <p:cNvCxnSpPr>
+            <a:cxnSpLocks/>
+            <a:stCxn id="59" idx="4"/>
+            <a:endCxn id="63" idx="3"/>
+          </p:cNvCxnSpPr>
+          <p:nvPr/>
+        </p:nvCxnSpPr>
+        <p:spPr>
+          <a:xfrm>
+            <a:off x="9528313" y="2974629"/>
+            <a:ext cx="4143" cy="244476"/>
+          </a:xfrm>
+          <a:prstGeom prst="straightConnector1">
+            <a:avLst/>
+          </a:prstGeom>
+          <a:ln>
+            <a:tailEnd type="triangle"/>
+          </a:ln>
+        </p:spPr>
+        <p:style>
+          <a:lnRef idx="2">
+            <a:schemeClr val="dk1"/>
+          </a:lnRef>
+          <a:fillRef idx="0">
+            <a:schemeClr val="dk1"/>
+          </a:fillRef>
+          <a:effectRef idx="1">
+            <a:schemeClr val="dk1"/>
+          </a:effectRef>
+          <a:fontRef idx="minor">
+            <a:schemeClr val="tx1"/>
+          </a:fontRef>
+        </p:style>
+      </p:cxnSp>
+      <p:sp>
+        <p:nvSpPr>
+          <p:cNvPr id="71" name="Rectangle: Rounded Corners 70">
+            <a:extLst>
+              <a:ext uri="{FF2B5EF4-FFF2-40B4-BE49-F238E27FC236}">
+                <a16:creationId xmlns:a16="http://schemas.microsoft.com/office/drawing/2014/main" id="{4EFF8EDF-B80F-B90F-C25D-4A50FE6FDD05}"/>
+              </a:ext>
+            </a:extLst>
+          </p:cNvPr>
+          <p:cNvSpPr/>
+          <p:nvPr/>
+        </p:nvSpPr>
+        <p:spPr>
+          <a:xfrm>
+            <a:off x="10060471" y="2136117"/>
+            <a:ext cx="1420466" cy="266218"/>
+          </a:xfrm>
+          <a:prstGeom prst="roundRect">
+            <a:avLst/>
+          </a:prstGeom>
+        </p:spPr>
+        <p:style>
+          <a:lnRef idx="2">
+            <a:schemeClr val="accent1">
+              <a:shade val="15000"/>
+            </a:schemeClr>
+          </a:lnRef>
+          <a:fillRef idx="1">
+            <a:schemeClr val="accent1"/>
+          </a:fillRef>
+          <a:effectRef idx="0">
+            <a:schemeClr val="accent1"/>
+          </a:effectRef>
+          <a:fontRef idx="minor">
+            <a:schemeClr val="lt1"/>
+          </a:fontRef>
+        </p:style>
+        <p:txBody>
+          <a:bodyPr rtlCol="0" anchor="ctr"/>
+          <a:lstStyle/>
+          <a:p>
+            <a:pPr algn="ctr"/>
+            <a:r>
+              <a:rPr lang="en-GB" sz="1200" dirty="0"/>
+              <a:t>Slurmsquared.sh</a:t>
+            </a:r>
+          </a:p>
+        </p:txBody>
+      </p:sp>
+      <p:sp>
+        <p:nvSpPr>
+          <p:cNvPr id="72" name="Rectangle: Rounded Corners 71">
+            <a:extLst>
+              <a:ext uri="{FF2B5EF4-FFF2-40B4-BE49-F238E27FC236}">
+                <a16:creationId xmlns:a16="http://schemas.microsoft.com/office/drawing/2014/main" id="{4B3B9BF8-3E62-486B-BE05-087E18E415F1}"/>
+              </a:ext>
+            </a:extLst>
+          </p:cNvPr>
+          <p:cNvSpPr/>
+          <p:nvPr/>
+        </p:nvSpPr>
+        <p:spPr>
+          <a:xfrm>
+            <a:off x="10222395" y="2677610"/>
+            <a:ext cx="1096618" cy="358861"/>
+          </a:xfrm>
+          <a:prstGeom prst="roundRect">
+            <a:avLst/>
+          </a:prstGeom>
+        </p:spPr>
+        <p:style>
+          <a:lnRef idx="2">
+            <a:schemeClr val="accent1">
+              <a:shade val="15000"/>
+            </a:schemeClr>
+          </a:lnRef>
+          <a:fillRef idx="1">
+            <a:schemeClr val="accent1"/>
+          </a:fillRef>
+          <a:effectRef idx="0">
+            <a:schemeClr val="accent1"/>
+          </a:effectRef>
+          <a:fontRef idx="minor">
+            <a:schemeClr val="lt1"/>
+          </a:fontRef>
+        </p:style>
+        <p:txBody>
+          <a:bodyPr rtlCol="0" anchor="ctr"/>
+          <a:lstStyle/>
+          <a:p>
+            <a:pPr algn="ctr"/>
+            <a:r>
+              <a:rPr lang="en-GB" sz="1200" dirty="0"/>
+              <a:t>Eggnogslurmrunner.sh</a:t>
+            </a:r>
+          </a:p>
+        </p:txBody>
+      </p:sp>
+      <p:cxnSp>
+        <p:nvCxnSpPr>
+          <p:cNvPr id="73" name="Straight Arrow Connector 72">
+            <a:extLst>
+              <a:ext uri="{FF2B5EF4-FFF2-40B4-BE49-F238E27FC236}">
+                <a16:creationId xmlns:a16="http://schemas.microsoft.com/office/drawing/2014/main" id="{6A5F1A8E-D4C6-30C2-BAF9-369BBE7A4B4D}"/>
+              </a:ext>
+            </a:extLst>
+          </p:cNvPr>
+          <p:cNvCxnSpPr>
+            <a:cxnSpLocks/>
+            <a:stCxn id="71" idx="2"/>
+            <a:endCxn id="72" idx="0"/>
+          </p:cNvCxnSpPr>
+          <p:nvPr/>
+        </p:nvCxnSpPr>
+        <p:spPr>
+          <a:xfrm>
+            <a:off x="10770704" y="2402335"/>
+            <a:ext cx="0" cy="275275"/>
+          </a:xfrm>
+          <a:prstGeom prst="straightConnector1">
+            <a:avLst/>
+          </a:prstGeom>
+          <a:ln>
+            <a:tailEnd type="triangle"/>
+          </a:ln>
+        </p:spPr>
+        <p:style>
+          <a:lnRef idx="2">
+            <a:schemeClr val="dk1"/>
+          </a:lnRef>
+          <a:fillRef idx="0">
+            <a:schemeClr val="dk1"/>
+          </a:fillRef>
+          <a:effectRef idx="1">
+            <a:schemeClr val="dk1"/>
+          </a:effectRef>
+          <a:fontRef idx="minor">
+            <a:schemeClr val="tx1"/>
+          </a:fontRef>
+        </p:style>
+      </p:cxnSp>
+      <p:cxnSp>
+        <p:nvCxnSpPr>
+          <p:cNvPr id="78" name="Straight Arrow Connector 77">
+            <a:extLst>
+              <a:ext uri="{FF2B5EF4-FFF2-40B4-BE49-F238E27FC236}">
+                <a16:creationId xmlns:a16="http://schemas.microsoft.com/office/drawing/2014/main" id="{7D290505-BADB-1369-5280-EBF84A5BCB9B}"/>
+              </a:ext>
+            </a:extLst>
+          </p:cNvPr>
+          <p:cNvCxnSpPr>
+            <a:cxnSpLocks/>
+            <a:stCxn id="72" idx="1"/>
+            <a:endCxn id="59" idx="6"/>
+          </p:cNvCxnSpPr>
+          <p:nvPr/>
+        </p:nvCxnSpPr>
+        <p:spPr>
+          <a:xfrm flipH="1" flipV="1">
+            <a:off x="10076622" y="2733778"/>
+            <a:ext cx="145773" cy="123263"/>
+          </a:xfrm>
+          <a:prstGeom prst="straightConnector1">
+            <a:avLst/>
+          </a:prstGeom>
+          <a:ln>
+            <a:tailEnd type="triangle"/>
+          </a:ln>
+        </p:spPr>
+        <p:style>
+          <a:lnRef idx="2">
+            <a:schemeClr val="dk1"/>
+          </a:lnRef>
+          <a:fillRef idx="0">
+            <a:schemeClr val="dk1"/>
+          </a:fillRef>
+          <a:effectRef idx="1">
+            <a:schemeClr val="dk1"/>
+          </a:effectRef>
+          <a:fontRef idx="minor">
+            <a:schemeClr val="tx1"/>
+          </a:fontRef>
+        </p:style>
+      </p:cxnSp>
+      <p:cxnSp>
+        <p:nvCxnSpPr>
+          <p:cNvPr id="81" name="Straight Arrow Connector 80">
+            <a:extLst>
+              <a:ext uri="{FF2B5EF4-FFF2-40B4-BE49-F238E27FC236}">
+                <a16:creationId xmlns:a16="http://schemas.microsoft.com/office/drawing/2014/main" id="{D0237980-FBE3-8768-32A1-B7248C175A6D}"/>
+              </a:ext>
+            </a:extLst>
+          </p:cNvPr>
+          <p:cNvCxnSpPr>
+            <a:cxnSpLocks/>
+            <a:stCxn id="63" idx="2"/>
+            <a:endCxn id="84" idx="0"/>
+          </p:cNvCxnSpPr>
+          <p:nvPr/>
+        </p:nvCxnSpPr>
+        <p:spPr>
+          <a:xfrm flipH="1">
+            <a:off x="4967707" y="3352214"/>
+            <a:ext cx="3736487" cy="382626"/>
+          </a:xfrm>
+          <a:prstGeom prst="straightConnector1">
+            <a:avLst/>
+          </a:prstGeom>
+          <a:ln>
+            <a:tailEnd type="triangle"/>
+          </a:ln>
+        </p:spPr>
+        <p:style>
+          <a:lnRef idx="2">
+            <a:schemeClr val="dk1"/>
+          </a:lnRef>
+          <a:fillRef idx="0">
+            <a:schemeClr val="dk1"/>
+          </a:fillRef>
+          <a:effectRef idx="1">
+            <a:schemeClr val="dk1"/>
+          </a:effectRef>
+          <a:fontRef idx="minor">
+            <a:schemeClr val="tx1"/>
+          </a:fontRef>
+        </p:style>
+      </p:cxnSp>
+      <p:sp>
+        <p:nvSpPr>
+          <p:cNvPr id="84" name="Rectangle: Single Corner Snipped 83">
+            <a:extLst>
+              <a:ext uri="{FF2B5EF4-FFF2-40B4-BE49-F238E27FC236}">
+                <a16:creationId xmlns:a16="http://schemas.microsoft.com/office/drawing/2014/main" id="{57AA310E-A877-BED1-F744-8C5A63911FAA}"/>
+              </a:ext>
+            </a:extLst>
+          </p:cNvPr>
+          <p:cNvSpPr/>
+          <p:nvPr/>
+        </p:nvSpPr>
+        <p:spPr>
+          <a:xfrm>
+            <a:off x="3407667" y="3457434"/>
+            <a:ext cx="1560040" cy="554812"/>
+          </a:xfrm>
+          <a:prstGeom prst="snip1Rect">
+            <a:avLst>
+              <a:gd name="adj" fmla="val 50000"/>
+            </a:avLst>
+          </a:prstGeom>
+        </p:spPr>
+        <p:style>
+          <a:lnRef idx="2">
+            <a:schemeClr val="accent1">
+              <a:shade val="15000"/>
+            </a:schemeClr>
+          </a:lnRef>
+          <a:fillRef idx="1">
+            <a:schemeClr val="accent1"/>
+          </a:fillRef>
+          <a:effectRef idx="0">
+            <a:schemeClr val="accent1"/>
+          </a:effectRef>
+          <a:fontRef idx="minor">
+            <a:schemeClr val="lt1"/>
+          </a:fontRef>
+        </p:style>
+        <p:txBody>
+          <a:bodyPr rtlCol="0" anchor="ctr"/>
+          <a:lstStyle/>
+          <a:p>
+            <a:pPr algn="ctr"/>
+            <a:r>
+              <a:rPr lang="en-GB" sz="1200" dirty="0"/>
+              <a:t>02…/</a:t>
+            </a:r>
+            <a:r>
+              <a:rPr lang="en-GB" sz="1200" dirty="0" err="1"/>
+              <a:t>eggnog_stuff</a:t>
+            </a:r>
+            <a:r>
+              <a:rPr lang="en-GB" sz="1200" dirty="0"/>
+              <a:t>/</a:t>
+            </a:r>
+            <a:r>
+              <a:rPr lang="en-GB" sz="1200" dirty="0" err="1"/>
+              <a:t>eggnog_outputs</a:t>
+            </a:r>
+            <a:endParaRPr lang="en-GB" sz="1200" dirty="0"/>
+          </a:p>
+        </p:txBody>
+      </p:sp>
+      <p:sp>
+        <p:nvSpPr>
+          <p:cNvPr id="91" name="Rectangle: Rounded Corners 90">
+            <a:extLst>
+              <a:ext uri="{FF2B5EF4-FFF2-40B4-BE49-F238E27FC236}">
+                <a16:creationId xmlns:a16="http://schemas.microsoft.com/office/drawing/2014/main" id="{1ACF3331-B080-33F1-0666-563DF45D087A}"/>
+              </a:ext>
+            </a:extLst>
+          </p:cNvPr>
+          <p:cNvSpPr/>
+          <p:nvPr/>
+        </p:nvSpPr>
+        <p:spPr>
+          <a:xfrm>
+            <a:off x="838200" y="4246011"/>
+            <a:ext cx="1070113" cy="441566"/>
+          </a:xfrm>
+          <a:prstGeom prst="roundRect">
+            <a:avLst/>
+          </a:prstGeom>
+        </p:spPr>
+        <p:style>
+          <a:lnRef idx="2">
+            <a:schemeClr val="accent1">
+              <a:shade val="15000"/>
+            </a:schemeClr>
+          </a:lnRef>
+          <a:fillRef idx="1">
+            <a:schemeClr val="accent1"/>
+          </a:fillRef>
+          <a:effectRef idx="0">
+            <a:schemeClr val="accent1"/>
+          </a:effectRef>
+          <a:fontRef idx="minor">
+            <a:schemeClr val="lt1"/>
+          </a:fontRef>
+        </p:style>
+        <p:txBody>
+          <a:bodyPr rtlCol="0" anchor="ctr"/>
+          <a:lstStyle/>
+          <a:p>
+            <a:pPr algn="ctr"/>
+            <a:r>
+              <a:rPr lang="en-GB" sz="1000" dirty="0"/>
+              <a:t>KEGG_pipeline_pt1_enrich</a:t>
+            </a:r>
+          </a:p>
+        </p:txBody>
+      </p:sp>
+      <p:sp>
+        <p:nvSpPr>
+          <p:cNvPr id="92" name="Rectangle: Rounded Corners 91">
+            <a:extLst>
+              <a:ext uri="{FF2B5EF4-FFF2-40B4-BE49-F238E27FC236}">
+                <a16:creationId xmlns:a16="http://schemas.microsoft.com/office/drawing/2014/main" id="{2510B8D1-9A33-7AA6-DCE8-3FB998BBBFB7}"/>
+              </a:ext>
+            </a:extLst>
+          </p:cNvPr>
+          <p:cNvSpPr/>
+          <p:nvPr/>
+        </p:nvSpPr>
+        <p:spPr>
+          <a:xfrm>
+            <a:off x="2170043" y="4247321"/>
+            <a:ext cx="1070113" cy="440255"/>
+          </a:xfrm>
+          <a:prstGeom prst="roundRect">
+            <a:avLst/>
+          </a:prstGeom>
+        </p:spPr>
+        <p:style>
+          <a:lnRef idx="2">
+            <a:schemeClr val="accent1">
+              <a:shade val="15000"/>
+            </a:schemeClr>
+          </a:lnRef>
+          <a:fillRef idx="1">
+            <a:schemeClr val="accent1"/>
+          </a:fillRef>
+          <a:effectRef idx="0">
+            <a:schemeClr val="accent1"/>
+          </a:effectRef>
+          <a:fontRef idx="minor">
+            <a:schemeClr val="lt1"/>
+          </a:fontRef>
+        </p:style>
+        <p:txBody>
+          <a:bodyPr rtlCol="0" anchor="ctr"/>
+          <a:lstStyle/>
+          <a:p>
+            <a:pPr algn="ctr"/>
+            <a:r>
+              <a:rPr lang="en-GB" sz="1000" dirty="0"/>
+              <a:t>KEGG_pipeline_pt2_aggregate</a:t>
+            </a:r>
+          </a:p>
+        </p:txBody>
+      </p:sp>
+      <p:sp>
+        <p:nvSpPr>
+          <p:cNvPr id="93" name="Rectangle: Rounded Corners 92">
+            <a:extLst>
+              <a:ext uri="{FF2B5EF4-FFF2-40B4-BE49-F238E27FC236}">
+                <a16:creationId xmlns:a16="http://schemas.microsoft.com/office/drawing/2014/main" id="{F5253372-5AD7-4C98-8568-4BC4BC1A14A7}"/>
+              </a:ext>
+            </a:extLst>
+          </p:cNvPr>
+          <p:cNvSpPr/>
+          <p:nvPr/>
+        </p:nvSpPr>
+        <p:spPr>
+          <a:xfrm>
+            <a:off x="3506856" y="4247321"/>
+            <a:ext cx="1070113" cy="440255"/>
+          </a:xfrm>
+          <a:prstGeom prst="roundRect">
+            <a:avLst/>
+          </a:prstGeom>
+        </p:spPr>
+        <p:style>
+          <a:lnRef idx="2">
+            <a:schemeClr val="accent1">
+              <a:shade val="15000"/>
+            </a:schemeClr>
+          </a:lnRef>
+          <a:fillRef idx="1">
+            <a:schemeClr val="accent1"/>
+          </a:fillRef>
+          <a:effectRef idx="0">
+            <a:schemeClr val="accent1"/>
+          </a:effectRef>
+          <a:fontRef idx="minor">
+            <a:schemeClr val="lt1"/>
+          </a:fontRef>
+        </p:style>
+        <p:txBody>
+          <a:bodyPr rtlCol="0" anchor="ctr"/>
+          <a:lstStyle/>
+          <a:p>
+            <a:pPr algn="ctr"/>
+            <a:r>
+              <a:rPr lang="en-GB" sz="1000" dirty="0"/>
+              <a:t>KEGG_pipeline_pt3_heatmap</a:t>
+            </a:r>
+          </a:p>
+        </p:txBody>
+      </p:sp>
+      <p:cxnSp>
+        <p:nvCxnSpPr>
+          <p:cNvPr id="94" name="Straight Arrow Connector 93">
+            <a:extLst>
+              <a:ext uri="{FF2B5EF4-FFF2-40B4-BE49-F238E27FC236}">
+                <a16:creationId xmlns:a16="http://schemas.microsoft.com/office/drawing/2014/main" id="{9B6E7096-DFFF-9E34-225F-28673079DD8A}"/>
+              </a:ext>
+            </a:extLst>
+          </p:cNvPr>
+          <p:cNvCxnSpPr>
+            <a:cxnSpLocks/>
+            <a:stCxn id="84" idx="2"/>
+            <a:endCxn id="91" idx="0"/>
+          </p:cNvCxnSpPr>
+          <p:nvPr/>
+        </p:nvCxnSpPr>
+        <p:spPr>
+          <a:xfrm flipH="1">
+            <a:off x="1373257" y="3734840"/>
+            <a:ext cx="2034410" cy="511171"/>
+          </a:xfrm>
+          <a:prstGeom prst="straightConnector1">
+            <a:avLst/>
+          </a:prstGeom>
+          <a:ln>
+            <a:tailEnd type="triangle"/>
+          </a:ln>
+        </p:spPr>
+        <p:style>
+          <a:lnRef idx="2">
+            <a:schemeClr val="dk1"/>
+          </a:lnRef>
+          <a:fillRef idx="0">
+            <a:schemeClr val="dk1"/>
+          </a:fillRef>
+          <a:effectRef idx="1">
+            <a:schemeClr val="dk1"/>
+          </a:effectRef>
+          <a:fontRef idx="minor">
+            <a:schemeClr val="tx1"/>
+          </a:fontRef>
+        </p:style>
+      </p:cxnSp>
+      <p:cxnSp>
+        <p:nvCxnSpPr>
+          <p:cNvPr id="95" name="Straight Arrow Connector 94">
+            <a:extLst>
+              <a:ext uri="{FF2B5EF4-FFF2-40B4-BE49-F238E27FC236}">
+                <a16:creationId xmlns:a16="http://schemas.microsoft.com/office/drawing/2014/main" id="{0CB7536D-ECBD-79F6-6965-147DBA969C93}"/>
+              </a:ext>
+            </a:extLst>
+          </p:cNvPr>
+          <p:cNvCxnSpPr>
+            <a:cxnSpLocks/>
+            <a:stCxn id="92" idx="3"/>
+            <a:endCxn id="93" idx="1"/>
+          </p:cNvCxnSpPr>
+          <p:nvPr/>
+        </p:nvCxnSpPr>
+        <p:spPr>
+          <a:xfrm>
+            <a:off x="3240156" y="4467449"/>
+            <a:ext cx="266700" cy="0"/>
+          </a:xfrm>
+          <a:prstGeom prst="straightConnector1">
+            <a:avLst/>
+          </a:prstGeom>
+          <a:ln>
+            <a:tailEnd type="triangle"/>
+          </a:ln>
+        </p:spPr>
+        <p:style>
+          <a:lnRef idx="2">
+            <a:schemeClr val="dk1"/>
+          </a:lnRef>
+          <a:fillRef idx="0">
+            <a:schemeClr val="dk1"/>
+          </a:fillRef>
+          <a:effectRef idx="1">
+            <a:schemeClr val="dk1"/>
+          </a:effectRef>
+          <a:fontRef idx="minor">
+            <a:schemeClr val="tx1"/>
+          </a:fontRef>
+        </p:style>
+      </p:cxnSp>
+      <p:cxnSp>
+        <p:nvCxnSpPr>
+          <p:cNvPr id="96" name="Straight Arrow Connector 95">
+            <a:extLst>
+              <a:ext uri="{FF2B5EF4-FFF2-40B4-BE49-F238E27FC236}">
+                <a16:creationId xmlns:a16="http://schemas.microsoft.com/office/drawing/2014/main" id="{617BF558-B082-D509-F98C-F2B93C791C43}"/>
+              </a:ext>
+            </a:extLst>
+          </p:cNvPr>
+          <p:cNvCxnSpPr>
+            <a:cxnSpLocks/>
+            <a:stCxn id="91" idx="3"/>
+            <a:endCxn id="92" idx="1"/>
+          </p:cNvCxnSpPr>
+          <p:nvPr/>
+        </p:nvCxnSpPr>
+        <p:spPr>
+          <a:xfrm>
+            <a:off x="1908313" y="4466794"/>
+            <a:ext cx="261730" cy="655"/>
+          </a:xfrm>
+          <a:prstGeom prst="straightConnector1">
+            <a:avLst/>
+          </a:prstGeom>
+          <a:ln>
+            <a:tailEnd type="triangle"/>
+          </a:ln>
+        </p:spPr>
+        <p:style>
+          <a:lnRef idx="2">
+            <a:schemeClr val="dk1"/>
+          </a:lnRef>
+          <a:fillRef idx="0">
+            <a:schemeClr val="dk1"/>
+          </a:fillRef>
+          <a:effectRef idx="1">
+            <a:schemeClr val="dk1"/>
+          </a:effectRef>
+          <a:fontRef idx="minor">
+            <a:schemeClr val="tx1"/>
+          </a:fontRef>
+        </p:style>
+      </p:cxnSp>
+      <p:sp>
+        <p:nvSpPr>
+          <p:cNvPr id="103" name="Flowchart: Off-page Connector 102">
+            <a:extLst>
+              <a:ext uri="{FF2B5EF4-FFF2-40B4-BE49-F238E27FC236}">
+                <a16:creationId xmlns:a16="http://schemas.microsoft.com/office/drawing/2014/main" id="{C238617A-4583-4233-7E2A-25DF32D5C91F}"/>
+              </a:ext>
+            </a:extLst>
+          </p:cNvPr>
+          <p:cNvSpPr/>
+          <p:nvPr/>
+        </p:nvSpPr>
+        <p:spPr>
+          <a:xfrm>
+            <a:off x="10484814" y="105319"/>
+            <a:ext cx="641074" cy="872678"/>
+          </a:xfrm>
+          <a:prstGeom prst="flowChartOffpageConnector">
+            <a:avLst/>
+          </a:prstGeom>
+        </p:spPr>
+        <p:style>
+          <a:lnRef idx="2">
+            <a:schemeClr val="accent1">
+              <a:shade val="15000"/>
+            </a:schemeClr>
+          </a:lnRef>
+          <a:fillRef idx="1">
+            <a:schemeClr val="accent1"/>
+          </a:fillRef>
+          <a:effectRef idx="0">
+            <a:schemeClr val="accent1"/>
+          </a:effectRef>
+          <a:fontRef idx="minor">
+            <a:schemeClr val="lt1"/>
+          </a:fontRef>
+        </p:style>
+        <p:txBody>
+          <a:bodyPr rtlCol="0" anchor="ctr"/>
+          <a:lstStyle/>
+          <a:p>
+            <a:pPr algn="ctr"/>
+            <a:r>
+              <a:rPr lang="en-GB" sz="1200" dirty="0"/>
+              <a:t>output</a:t>
+            </a:r>
+          </a:p>
+        </p:txBody>
+      </p:sp>
+      <p:sp>
+        <p:nvSpPr>
+          <p:cNvPr id="104" name="Flowchart: Off-page Connector 103">
+            <a:extLst>
+              <a:ext uri="{FF2B5EF4-FFF2-40B4-BE49-F238E27FC236}">
+                <a16:creationId xmlns:a16="http://schemas.microsoft.com/office/drawing/2014/main" id="{0D2B25ED-0165-3A51-8426-61A4421D14CC}"/>
+              </a:ext>
+            </a:extLst>
+          </p:cNvPr>
+          <p:cNvSpPr/>
+          <p:nvPr/>
+        </p:nvSpPr>
+        <p:spPr>
+          <a:xfrm>
+            <a:off x="3616599" y="4935910"/>
+            <a:ext cx="850625" cy="490862"/>
+          </a:xfrm>
+          <a:prstGeom prst="flowChartOffpageConnector">
+            <a:avLst/>
+          </a:prstGeom>
+        </p:spPr>
+        <p:style>
+          <a:lnRef idx="2">
+            <a:schemeClr val="accent1">
+              <a:shade val="15000"/>
+            </a:schemeClr>
+          </a:lnRef>
+          <a:fillRef idx="1">
+            <a:schemeClr val="accent1"/>
+          </a:fillRef>
+          <a:effectRef idx="0">
+            <a:schemeClr val="accent1"/>
+          </a:effectRef>
+          <a:fontRef idx="minor">
+            <a:schemeClr val="lt1"/>
+          </a:fontRef>
+        </p:style>
+        <p:txBody>
+          <a:bodyPr rtlCol="0" anchor="ctr"/>
+          <a:lstStyle/>
+          <a:p>
+            <a:pPr algn="ctr"/>
+            <a:r>
+              <a:rPr lang="en-GB" sz="1200" dirty="0"/>
+              <a:t>heatmaps</a:t>
+            </a:r>
+          </a:p>
+        </p:txBody>
+      </p:sp>
+      <p:cxnSp>
+        <p:nvCxnSpPr>
+          <p:cNvPr id="105" name="Straight Arrow Connector 104">
+            <a:extLst>
+              <a:ext uri="{FF2B5EF4-FFF2-40B4-BE49-F238E27FC236}">
+                <a16:creationId xmlns:a16="http://schemas.microsoft.com/office/drawing/2014/main" id="{3309F860-0934-E628-5DDA-940A3FEDAE76}"/>
+              </a:ext>
+            </a:extLst>
+          </p:cNvPr>
+          <p:cNvCxnSpPr>
+            <a:cxnSpLocks/>
+            <a:stCxn id="93" idx="2"/>
+            <a:endCxn id="104" idx="0"/>
+          </p:cNvCxnSpPr>
+          <p:nvPr/>
+        </p:nvCxnSpPr>
+        <p:spPr>
+          <a:xfrm flipH="1">
+            <a:off x="4041912" y="4687576"/>
+            <a:ext cx="1" cy="248334"/>
+          </a:xfrm>
+          <a:prstGeom prst="straightConnector1">
+            <a:avLst/>
+          </a:prstGeom>
+          <a:ln>
+            <a:tailEnd type="triangle"/>
+          </a:ln>
+        </p:spPr>
+        <p:style>
+          <a:lnRef idx="2">
+            <a:schemeClr val="dk1"/>
+          </a:lnRef>
+          <a:fillRef idx="0">
+            <a:schemeClr val="dk1"/>
+          </a:fillRef>
+          <a:effectRef idx="1">
+            <a:schemeClr val="dk1"/>
+          </a:effectRef>
+          <a:fontRef idx="minor">
+            <a:schemeClr val="tx1"/>
+          </a:fontRef>
+        </p:style>
+      </p:cxnSp>
+      <p:sp>
+        <p:nvSpPr>
+          <p:cNvPr id="3" name="Oval 2">
+            <a:extLst>
+              <a:ext uri="{FF2B5EF4-FFF2-40B4-BE49-F238E27FC236}">
+                <a16:creationId xmlns:a16="http://schemas.microsoft.com/office/drawing/2014/main" id="{3B80E8BE-F88D-C683-2506-C051430F3038}"/>
+              </a:ext>
+            </a:extLst>
+          </p:cNvPr>
+          <p:cNvSpPr/>
+          <p:nvPr/>
+        </p:nvSpPr>
+        <p:spPr>
+          <a:xfrm>
+            <a:off x="2151541" y="2327256"/>
+            <a:ext cx="1070112" cy="484577"/>
+          </a:xfrm>
+          <a:prstGeom prst="ellipse">
+            <a:avLst/>
+          </a:prstGeom>
+        </p:spPr>
+        <p:style>
+          <a:lnRef idx="2">
+            <a:schemeClr val="accent1">
+              <a:shade val="15000"/>
+            </a:schemeClr>
+          </a:lnRef>
+          <a:fillRef idx="1">
+            <a:schemeClr val="accent1"/>
+          </a:fillRef>
+          <a:effectRef idx="0">
+            <a:schemeClr val="accent1"/>
+          </a:effectRef>
+          <a:fontRef idx="minor">
+            <a:schemeClr val="lt1"/>
+          </a:fontRef>
+        </p:style>
+        <p:txBody>
+          <a:bodyPr rtlCol="0" anchor="ctr"/>
+          <a:lstStyle/>
+          <a:p>
+            <a:pPr algn="ctr"/>
+            <a:r>
+              <a:rPr lang="en-GB" sz="1200" dirty="0"/>
+              <a:t>GTDB-TK</a:t>
+            </a:r>
+          </a:p>
+        </p:txBody>
+      </p:sp>
+      <p:cxnSp>
+        <p:nvCxnSpPr>
+          <p:cNvPr id="12" name="Straight Arrow Connector 11">
+            <a:extLst>
+              <a:ext uri="{FF2B5EF4-FFF2-40B4-BE49-F238E27FC236}">
+                <a16:creationId xmlns:a16="http://schemas.microsoft.com/office/drawing/2014/main" id="{60EE5724-8388-D5E8-E10F-230AAB3F1CDA}"/>
+              </a:ext>
+            </a:extLst>
+          </p:cNvPr>
+          <p:cNvCxnSpPr>
+            <a:cxnSpLocks/>
+            <a:stCxn id="3" idx="4"/>
+            <a:endCxn id="20" idx="3"/>
+          </p:cNvCxnSpPr>
+          <p:nvPr/>
+        </p:nvCxnSpPr>
+        <p:spPr>
+          <a:xfrm flipH="1" flipV="1">
+            <a:off x="2004108" y="2492927"/>
+            <a:ext cx="682489" cy="318906"/>
+          </a:xfrm>
+          <a:prstGeom prst="straightConnector1">
+            <a:avLst/>
+          </a:prstGeom>
+          <a:ln>
+            <a:tailEnd type="triangle"/>
+          </a:ln>
+        </p:spPr>
+        <p:style>
+          <a:lnRef idx="2">
+            <a:schemeClr val="dk1"/>
+          </a:lnRef>
+          <a:fillRef idx="0">
+            <a:schemeClr val="dk1"/>
+          </a:fillRef>
+          <a:effectRef idx="1">
+            <a:schemeClr val="dk1"/>
+          </a:effectRef>
+          <a:fontRef idx="minor">
+            <a:schemeClr val="tx1"/>
+          </a:fontRef>
+        </p:style>
+      </p:cxnSp>
+      <p:cxnSp>
+        <p:nvCxnSpPr>
+          <p:cNvPr id="23" name="Straight Arrow Connector 22">
+            <a:extLst>
+              <a:ext uri="{FF2B5EF4-FFF2-40B4-BE49-F238E27FC236}">
+                <a16:creationId xmlns:a16="http://schemas.microsoft.com/office/drawing/2014/main" id="{217DA67E-7750-F7D9-1786-853D0567716E}"/>
+              </a:ext>
+            </a:extLst>
+          </p:cNvPr>
+          <p:cNvCxnSpPr>
+            <a:cxnSpLocks/>
+            <a:stCxn id="3" idx="6"/>
+            <a:endCxn id="14" idx="1"/>
+          </p:cNvCxnSpPr>
+          <p:nvPr/>
+        </p:nvCxnSpPr>
+        <p:spPr>
+          <a:xfrm flipV="1">
+            <a:off x="3221653" y="2492927"/>
+            <a:ext cx="75229" cy="76618"/>
+          </a:xfrm>
+          <a:prstGeom prst="straightConnector1">
+            <a:avLst/>
+          </a:prstGeom>
+          <a:ln>
+            <a:tailEnd type="triangle"/>
+          </a:ln>
+        </p:spPr>
+        <p:style>
+          <a:lnRef idx="2">
+            <a:schemeClr val="dk1"/>
+          </a:lnRef>
+          <a:fillRef idx="0">
+            <a:schemeClr val="dk1"/>
+          </a:fillRef>
+          <a:effectRef idx="1">
+            <a:schemeClr val="dk1"/>
+          </a:effectRef>
+          <a:fontRef idx="minor">
+            <a:schemeClr val="tx1"/>
+          </a:fontRef>
+        </p:style>
+      </p:cxnSp>
+    </p:spTree>
+    <p:extLst>
+      <p:ext uri="{BB962C8B-B14F-4D97-AF65-F5344CB8AC3E}">
+        <p14:creationId xmlns:p14="http://schemas.microsoft.com/office/powerpoint/2010/main" val="1403748661"/>
+      </p:ext>
+    </p:extLst>
+  </p:cSld>
+  <p:clrMapOvr>
+    <a:masterClrMapping/>
+  </p:clrMapOvr>
+</p:sld>
+</file>
+
+<file path=ppt/slides/slide4.xml><?xml version="1.0" encoding="utf-8"?>
+<p:sld xmlns:a="http://schemas.openxmlformats.org/drawingml/2006/main" xmlns:r="http://schemas.openxmlformats.org/officeDocument/2006/relationships" xmlns:p="http://schemas.openxmlformats.org/presentationml/2006/main">
+  <p:cSld>
+    <p:spTree>
+      <p:nvGrpSpPr>
+        <p:cNvPr id="1" name=""/>
+        <p:cNvGrpSpPr/>
+        <p:nvPr/>
+      </p:nvGrpSpPr>
+      <p:grpSpPr>
+        <a:xfrm>
+          <a:off x="0" y="0"/>
+          <a:ext cx="0" cy="0"/>
+          <a:chOff x="0" y="0"/>
+          <a:chExt cx="0" cy="0"/>
+        </a:xfrm>
+      </p:grpSpPr>
+      <p:grpSp>
+        <p:nvGrpSpPr>
+          <p:cNvPr id="10" name="key">
+            <a:extLst>
+              <a:ext uri="{FF2B5EF4-FFF2-40B4-BE49-F238E27FC236}">
+                <a16:creationId xmlns:a16="http://schemas.microsoft.com/office/drawing/2014/main" id="{A99AA528-A911-CB38-3BD7-7A21B3591001}"/>
+              </a:ext>
+            </a:extLst>
+          </p:cNvPr>
+          <p:cNvGrpSpPr/>
+          <p:nvPr/>
+        </p:nvGrpSpPr>
+        <p:grpSpPr>
+          <a:xfrm>
+            <a:off x="11010340" y="158320"/>
+            <a:ext cx="1013792" cy="3906165"/>
+            <a:chOff x="11051828" y="2705935"/>
+            <a:chExt cx="1013792" cy="3906165"/>
+          </a:xfrm>
+        </p:grpSpPr>
+        <p:sp>
+          <p:nvSpPr>
+            <p:cNvPr id="2" name="Rectangle: Rounded Corners 1">
+              <a:extLst>
+                <a:ext uri="{FF2B5EF4-FFF2-40B4-BE49-F238E27FC236}">
+                  <a16:creationId xmlns:a16="http://schemas.microsoft.com/office/drawing/2014/main" id="{97CB2FEB-C544-E863-EC04-E2485C49765A}"/>
+                </a:ext>
+              </a:extLst>
+            </p:cNvPr>
+            <p:cNvSpPr/>
+            <p:nvPr/>
+          </p:nvSpPr>
+          <p:spPr>
+            <a:xfrm>
+              <a:off x="11157845" y="3605669"/>
+              <a:ext cx="821634" cy="287545"/>
+            </a:xfrm>
+            <a:prstGeom prst="roundRect">
+              <a:avLst/>
+            </a:prstGeom>
+          </p:spPr>
+          <p:style>
+            <a:lnRef idx="2">
+              <a:schemeClr val="accent1">
+                <a:shade val="15000"/>
+              </a:schemeClr>
+            </a:lnRef>
+            <a:fillRef idx="1">
+              <a:schemeClr val="accent1"/>
+            </a:fillRef>
+            <a:effectRef idx="0">
+              <a:schemeClr val="accent1"/>
+            </a:effectRef>
+            <a:fontRef idx="minor">
+              <a:schemeClr val="lt1"/>
+            </a:fontRef>
+          </p:style>
+          <p:txBody>
+            <a:bodyPr rtlCol="0" anchor="ctr"/>
+            <a:lstStyle/>
+            <a:p>
+              <a:pPr algn="ctr"/>
+              <a:r>
+                <a:rPr lang="en-GB" sz="1200" dirty="0"/>
+                <a:t>Script</a:t>
+              </a:r>
+            </a:p>
+          </p:txBody>
+        </p:sp>
+        <p:sp>
+          <p:nvSpPr>
+            <p:cNvPr id="3" name="Oval 2">
+              <a:extLst>
+                <a:ext uri="{FF2B5EF4-FFF2-40B4-BE49-F238E27FC236}">
+                  <a16:creationId xmlns:a16="http://schemas.microsoft.com/office/drawing/2014/main" id="{5327736D-B844-D98F-289E-B1DE73D9B23A}"/>
+                </a:ext>
+              </a:extLst>
+            </p:cNvPr>
+            <p:cNvSpPr/>
+            <p:nvPr/>
+          </p:nvSpPr>
+          <p:spPr>
+            <a:xfrm>
+              <a:off x="11051828" y="5005211"/>
+              <a:ext cx="1013792" cy="321987"/>
+            </a:xfrm>
+            <a:prstGeom prst="ellipse">
+              <a:avLst/>
+            </a:prstGeom>
+          </p:spPr>
+          <p:style>
+            <a:lnRef idx="2">
+              <a:schemeClr val="accent1">
+                <a:shade val="15000"/>
+              </a:schemeClr>
+            </a:lnRef>
+            <a:fillRef idx="1">
+              <a:schemeClr val="accent1"/>
+            </a:fillRef>
+            <a:effectRef idx="0">
+              <a:schemeClr val="accent1"/>
+            </a:effectRef>
+            <a:fontRef idx="minor">
+              <a:schemeClr val="lt1"/>
+            </a:fontRef>
+          </p:style>
+          <p:txBody>
+            <a:bodyPr rtlCol="0" anchor="ctr"/>
+            <a:lstStyle/>
+            <a:p>
+              <a:pPr algn="ctr"/>
+              <a:r>
+                <a:rPr lang="en-GB" sz="1200" dirty="0"/>
+                <a:t>process</a:t>
+              </a:r>
+            </a:p>
+          </p:txBody>
+        </p:sp>
+        <p:sp>
+          <p:nvSpPr>
+            <p:cNvPr id="4" name="Rectangle: Single Corner Snipped 3">
+              <a:extLst>
+                <a:ext uri="{FF2B5EF4-FFF2-40B4-BE49-F238E27FC236}">
+                  <a16:creationId xmlns:a16="http://schemas.microsoft.com/office/drawing/2014/main" id="{C6FEEDF2-67ED-B770-2F22-CCCA284DB130}"/>
+                </a:ext>
+              </a:extLst>
+            </p:cNvPr>
+            <p:cNvSpPr/>
+            <p:nvPr/>
+          </p:nvSpPr>
+          <p:spPr>
+            <a:xfrm>
+              <a:off x="11071705" y="4305440"/>
+              <a:ext cx="993915" cy="287545"/>
+            </a:xfrm>
+            <a:prstGeom prst="snip1Rect">
+              <a:avLst>
+                <a:gd name="adj" fmla="val 50000"/>
+              </a:avLst>
+            </a:prstGeom>
+          </p:spPr>
+          <p:style>
+            <a:lnRef idx="2">
+              <a:schemeClr val="accent1">
+                <a:shade val="15000"/>
+              </a:schemeClr>
+            </a:lnRef>
+            <a:fillRef idx="1">
+              <a:schemeClr val="accent1"/>
+            </a:fillRef>
+            <a:effectRef idx="0">
+              <a:schemeClr val="accent1"/>
+            </a:effectRef>
+            <a:fontRef idx="minor">
+              <a:schemeClr val="lt1"/>
+            </a:fontRef>
+          </p:style>
+          <p:txBody>
+            <a:bodyPr rtlCol="0" anchor="ctr"/>
+            <a:lstStyle/>
+            <a:p>
+              <a:pPr algn="ctr"/>
+              <a:r>
+                <a:rPr lang="en-GB" sz="1200" dirty="0"/>
+                <a:t>folder</a:t>
+              </a:r>
+            </a:p>
+          </p:txBody>
+        </p:sp>
+        <p:sp>
+          <p:nvSpPr>
+            <p:cNvPr id="5" name="Flowchart: Off-page Connector 4">
+              <a:extLst>
+                <a:ext uri="{FF2B5EF4-FFF2-40B4-BE49-F238E27FC236}">
+                  <a16:creationId xmlns:a16="http://schemas.microsoft.com/office/drawing/2014/main" id="{070322CC-EB66-F480-3812-8EDDB51724E8}"/>
+                </a:ext>
+              </a:extLst>
+            </p:cNvPr>
+            <p:cNvSpPr/>
+            <p:nvPr/>
+          </p:nvSpPr>
+          <p:spPr>
+            <a:xfrm>
+              <a:off x="11238187" y="5739422"/>
+              <a:ext cx="641074" cy="872678"/>
+            </a:xfrm>
+            <a:prstGeom prst="flowChartOffpageConnector">
+              <a:avLst/>
+            </a:prstGeom>
+          </p:spPr>
+          <p:style>
+            <a:lnRef idx="2">
+              <a:schemeClr val="accent1">
+                <a:shade val="15000"/>
+              </a:schemeClr>
+            </a:lnRef>
+            <a:fillRef idx="1">
+              <a:schemeClr val="accent1"/>
+            </a:fillRef>
+            <a:effectRef idx="0">
+              <a:schemeClr val="accent1"/>
+            </a:effectRef>
+            <a:fontRef idx="minor">
+              <a:schemeClr val="lt1"/>
+            </a:fontRef>
+          </p:style>
+          <p:txBody>
+            <a:bodyPr rtlCol="0" anchor="ctr"/>
+            <a:lstStyle/>
+            <a:p>
+              <a:pPr algn="ctr"/>
+              <a:r>
+                <a:rPr lang="en-GB" sz="1200" dirty="0"/>
+                <a:t>output</a:t>
+              </a:r>
+            </a:p>
+          </p:txBody>
+        </p:sp>
+        <p:grpSp>
+          <p:nvGrpSpPr>
+            <p:cNvPr id="9" name="Group 8">
+              <a:extLst>
+                <a:ext uri="{FF2B5EF4-FFF2-40B4-BE49-F238E27FC236}">
+                  <a16:creationId xmlns:a16="http://schemas.microsoft.com/office/drawing/2014/main" id="{DDCB8745-B0CC-4B23-8FFD-BCB93F8F5B07}"/>
+                </a:ext>
+              </a:extLst>
+            </p:cNvPr>
+            <p:cNvGrpSpPr/>
+            <p:nvPr/>
+          </p:nvGrpSpPr>
+          <p:grpSpPr>
+            <a:xfrm>
+              <a:off x="11135321" y="2705935"/>
+              <a:ext cx="866681" cy="487508"/>
+              <a:chOff x="11135321" y="2725010"/>
+              <a:chExt cx="866681" cy="487508"/>
+            </a:xfrm>
+          </p:grpSpPr>
+          <p:sp>
+            <p:nvSpPr>
+              <p:cNvPr id="8" name="Rectangle 7">
+                <a:extLst>
+                  <a:ext uri="{FF2B5EF4-FFF2-40B4-BE49-F238E27FC236}">
+                    <a16:creationId xmlns:a16="http://schemas.microsoft.com/office/drawing/2014/main" id="{A29621AC-E79E-73AA-A3BA-97304B5EC073}"/>
+                  </a:ext>
+                </a:extLst>
+              </p:cNvPr>
+              <p:cNvSpPr/>
+              <p:nvPr/>
+            </p:nvSpPr>
+            <p:spPr>
+              <a:xfrm>
+                <a:off x="11135321" y="2725010"/>
+                <a:ext cx="866681" cy="487508"/>
+              </a:xfrm>
+              <a:prstGeom prst="rect">
+                <a:avLst/>
+              </a:prstGeom>
+              <a:gradFill flip="none" rotWithShape="1">
+                <a:gsLst>
+                  <a:gs pos="52000">
+                    <a:srgbClr val="5481AB"/>
+                  </a:gs>
+                  <a:gs pos="25000">
+                    <a:srgbClr val="0F296B"/>
+                  </a:gs>
+                  <a:gs pos="0">
+                    <a:schemeClr val="tx1"/>
+                  </a:gs>
+                  <a:gs pos="73000">
+                    <a:srgbClr val="DFAC00"/>
+                  </a:gs>
+                </a:gsLst>
+                <a:lin ang="16200000" scaled="1"/>
+                <a:tileRect/>
+              </a:gradFill>
+              <a:ln>
+                <a:noFill/>
+              </a:ln>
+            </p:spPr>
+            <p:style>
+              <a:lnRef idx="2">
+                <a:schemeClr val="accent1">
+                  <a:shade val="15000"/>
+                </a:schemeClr>
+              </a:lnRef>
+              <a:fillRef idx="1">
+                <a:schemeClr val="accent1"/>
+              </a:fillRef>
+              <a:effectRef idx="0">
+                <a:schemeClr val="accent1"/>
+              </a:effectRef>
+              <a:fontRef idx="minor">
+                <a:schemeClr val="lt1"/>
+              </a:fontRef>
+            </p:style>
+            <p:txBody>
+              <a:bodyPr rtlCol="0" anchor="ctr"/>
+              <a:lstStyle/>
+              <a:p>
+                <a:pPr algn="ctr"/>
+                <a:endParaRPr lang="en-GB"/>
+              </a:p>
+            </p:txBody>
+          </p:sp>
+          <p:sp>
+            <p:nvSpPr>
+              <p:cNvPr id="7" name="TextBox 6">
+                <a:extLst>
+                  <a:ext uri="{FF2B5EF4-FFF2-40B4-BE49-F238E27FC236}">
+                    <a16:creationId xmlns:a16="http://schemas.microsoft.com/office/drawing/2014/main" id="{7A1C1B6C-4A83-4AFB-1881-BEFB869D878A}"/>
+                  </a:ext>
+                </a:extLst>
+              </p:cNvPr>
+              <p:cNvSpPr txBox="1"/>
+              <p:nvPr/>
+            </p:nvSpPr>
+            <p:spPr>
+              <a:xfrm>
+                <a:off x="11287372" y="2784098"/>
+                <a:ext cx="562578" cy="369332"/>
+              </a:xfrm>
+              <a:prstGeom prst="rect">
+                <a:avLst/>
+              </a:prstGeom>
+              <a:noFill/>
+            </p:spPr>
+            <p:txBody>
+              <a:bodyPr wrap="square" rtlCol="0">
+                <a:spAutoFit/>
+              </a:bodyPr>
+              <a:lstStyle/>
+              <a:p>
+                <a:r>
+                  <a:rPr lang="en-GB" dirty="0">
+                    <a:solidFill>
+                      <a:schemeClr val="bg1"/>
+                    </a:solidFill>
+                  </a:rPr>
+                  <a:t>key</a:t>
+                </a:r>
+              </a:p>
+            </p:txBody>
+          </p:sp>
+        </p:grpSp>
+      </p:grpSp>
+      <p:grpSp>
+        <p:nvGrpSpPr>
+          <p:cNvPr id="16" name="Group 15">
+            <a:extLst>
+              <a:ext uri="{FF2B5EF4-FFF2-40B4-BE49-F238E27FC236}">
+                <a16:creationId xmlns:a16="http://schemas.microsoft.com/office/drawing/2014/main" id="{B625FBB0-5964-C3FA-36D3-AD1FC74EBE31}"/>
+              </a:ext>
+            </a:extLst>
+          </p:cNvPr>
+          <p:cNvGrpSpPr/>
+          <p:nvPr/>
+        </p:nvGrpSpPr>
+        <p:grpSpPr>
+          <a:xfrm>
+            <a:off x="-30778" y="5583384"/>
+            <a:ext cx="12222778" cy="1274616"/>
+            <a:chOff x="-30778" y="5583384"/>
+            <a:chExt cx="12222778" cy="1274616"/>
+          </a:xfrm>
+        </p:grpSpPr>
+        <p:sp>
+          <p:nvSpPr>
+            <p:cNvPr id="13" name="Rectangle 12">
+              <a:extLst>
+                <a:ext uri="{FF2B5EF4-FFF2-40B4-BE49-F238E27FC236}">
+                  <a16:creationId xmlns:a16="http://schemas.microsoft.com/office/drawing/2014/main" id="{4CA02645-1637-03B3-E6CB-F318A7F760F9}"/>
+                </a:ext>
+              </a:extLst>
+            </p:cNvPr>
+            <p:cNvSpPr/>
+            <p:nvPr/>
+          </p:nvSpPr>
+          <p:spPr>
+            <a:xfrm>
+              <a:off x="0" y="5598240"/>
+              <a:ext cx="12192000" cy="1259760"/>
+            </a:xfrm>
+            <a:prstGeom prst="rect">
+              <a:avLst/>
+            </a:prstGeom>
+            <a:solidFill>
+              <a:srgbClr val="DFAC00">
+                <a:alpha val="30000"/>
+              </a:srgbClr>
+            </a:solidFill>
+            <a:ln>
+              <a:noFill/>
+            </a:ln>
+          </p:spPr>
+          <p:style>
+            <a:lnRef idx="2">
+              <a:schemeClr val="accent1">
+                <a:shade val="15000"/>
+              </a:schemeClr>
+            </a:lnRef>
+            <a:fillRef idx="1">
+              <a:schemeClr val="accent1"/>
+            </a:fillRef>
+            <a:effectRef idx="0">
+              <a:schemeClr val="accent1"/>
+            </a:effectRef>
+            <a:fontRef idx="minor">
+              <a:schemeClr val="lt1"/>
+            </a:fontRef>
+          </p:style>
+          <p:txBody>
+            <a:bodyPr rtlCol="0" anchor="ctr"/>
+            <a:lstStyle/>
+            <a:p>
+              <a:pPr algn="ctr"/>
+              <a:endParaRPr lang="en-GB" dirty="0"/>
+            </a:p>
+          </p:txBody>
+        </p:sp>
+        <p:sp>
+          <p:nvSpPr>
+            <p:cNvPr id="14" name="TextBox 13">
+              <a:extLst>
+                <a:ext uri="{FF2B5EF4-FFF2-40B4-BE49-F238E27FC236}">
+                  <a16:creationId xmlns:a16="http://schemas.microsoft.com/office/drawing/2014/main" id="{5FAA40D7-1309-73E3-AF77-BE278151C5E0}"/>
+                </a:ext>
+              </a:extLst>
+            </p:cNvPr>
+            <p:cNvSpPr txBox="1"/>
+            <p:nvPr/>
+          </p:nvSpPr>
+          <p:spPr>
+            <a:xfrm>
+              <a:off x="-30778" y="5583384"/>
+              <a:ext cx="1259760" cy="461665"/>
+            </a:xfrm>
+            <a:prstGeom prst="rect">
+              <a:avLst/>
+            </a:prstGeom>
+            <a:noFill/>
+          </p:spPr>
+          <p:txBody>
+            <a:bodyPr wrap="square" rtlCol="0">
+              <a:spAutoFit/>
+            </a:bodyPr>
+            <a:lstStyle/>
+            <a:p>
+              <a:pPr algn="ctr"/>
+              <a:r>
+                <a:rPr lang="en-GB" sz="2400" dirty="0"/>
+                <a:t>outputs</a:t>
+              </a:r>
+            </a:p>
+          </p:txBody>
+        </p:sp>
+      </p:grpSp>
+      <p:grpSp>
+        <p:nvGrpSpPr>
+          <p:cNvPr id="17" name="Group 16">
+            <a:extLst>
+              <a:ext uri="{FF2B5EF4-FFF2-40B4-BE49-F238E27FC236}">
+                <a16:creationId xmlns:a16="http://schemas.microsoft.com/office/drawing/2014/main" id="{4129C8A7-81AF-D1B9-2A01-B43CDFBF6A5C}"/>
+              </a:ext>
+            </a:extLst>
+          </p:cNvPr>
+          <p:cNvGrpSpPr/>
+          <p:nvPr/>
+        </p:nvGrpSpPr>
+        <p:grpSpPr>
+          <a:xfrm>
+            <a:off x="-30778" y="4338478"/>
+            <a:ext cx="12222778" cy="1259760"/>
+            <a:chOff x="-30778" y="5598240"/>
+            <a:chExt cx="12222778" cy="1259760"/>
+          </a:xfrm>
+        </p:grpSpPr>
+        <p:sp>
+          <p:nvSpPr>
+            <p:cNvPr id="18" name="Rectangle 17">
+              <a:extLst>
+                <a:ext uri="{FF2B5EF4-FFF2-40B4-BE49-F238E27FC236}">
+                  <a16:creationId xmlns:a16="http://schemas.microsoft.com/office/drawing/2014/main" id="{4FFF8285-B806-F12F-F184-F3FE70FA5123}"/>
+                </a:ext>
+              </a:extLst>
+            </p:cNvPr>
+            <p:cNvSpPr/>
+            <p:nvPr/>
+          </p:nvSpPr>
+          <p:spPr>
+            <a:xfrm>
+              <a:off x="0" y="5598240"/>
+              <a:ext cx="12192000" cy="1259760"/>
+            </a:xfrm>
+            <a:prstGeom prst="rect">
+              <a:avLst/>
+            </a:prstGeom>
+            <a:solidFill>
+              <a:srgbClr val="5481AB">
+                <a:alpha val="30000"/>
+              </a:srgbClr>
+            </a:solidFill>
+            <a:ln>
+              <a:noFill/>
+            </a:ln>
+          </p:spPr>
+          <p:style>
+            <a:lnRef idx="2">
+              <a:schemeClr val="accent1">
+                <a:shade val="15000"/>
+              </a:schemeClr>
+            </a:lnRef>
+            <a:fillRef idx="1">
+              <a:schemeClr val="accent1"/>
+            </a:fillRef>
+            <a:effectRef idx="0">
+              <a:schemeClr val="accent1"/>
+            </a:effectRef>
+            <a:fontRef idx="minor">
+              <a:schemeClr val="lt1"/>
+            </a:fontRef>
+          </p:style>
+          <p:txBody>
+            <a:bodyPr rtlCol="0" anchor="ctr"/>
+            <a:lstStyle/>
+            <a:p>
+              <a:pPr algn="ctr"/>
+              <a:endParaRPr lang="en-GB" dirty="0"/>
+            </a:p>
+          </p:txBody>
+        </p:sp>
+        <p:sp>
+          <p:nvSpPr>
+            <p:cNvPr id="19" name="TextBox 18">
+              <a:extLst>
+                <a:ext uri="{FF2B5EF4-FFF2-40B4-BE49-F238E27FC236}">
+                  <a16:creationId xmlns:a16="http://schemas.microsoft.com/office/drawing/2014/main" id="{F3AF10F2-8734-81FF-532C-0CD34D4BD0E8}"/>
+                </a:ext>
+              </a:extLst>
+            </p:cNvPr>
+            <p:cNvSpPr txBox="1"/>
+            <p:nvPr/>
+          </p:nvSpPr>
+          <p:spPr>
+            <a:xfrm>
+              <a:off x="-30778" y="5627955"/>
+              <a:ext cx="1259760" cy="1200329"/>
+            </a:xfrm>
+            <a:prstGeom prst="rect">
+              <a:avLst/>
+            </a:prstGeom>
+            <a:noFill/>
+          </p:spPr>
+          <p:txBody>
+            <a:bodyPr wrap="square" rtlCol="0">
+              <a:spAutoFit/>
+            </a:bodyPr>
+            <a:lstStyle/>
+            <a:p>
+              <a:pPr algn="ctr"/>
+              <a:r>
+                <a:rPr lang="en-GB" sz="2400" dirty="0"/>
+                <a:t>End-pipeline files</a:t>
+              </a:r>
+            </a:p>
+          </p:txBody>
+        </p:sp>
+      </p:grpSp>
+      <p:grpSp>
+        <p:nvGrpSpPr>
+          <p:cNvPr id="20" name="Group 19">
+            <a:extLst>
+              <a:ext uri="{FF2B5EF4-FFF2-40B4-BE49-F238E27FC236}">
+                <a16:creationId xmlns:a16="http://schemas.microsoft.com/office/drawing/2014/main" id="{B18A70EF-E518-7C82-4EB9-5158C80D68E0}"/>
+              </a:ext>
+            </a:extLst>
+          </p:cNvPr>
+          <p:cNvGrpSpPr/>
+          <p:nvPr/>
+        </p:nvGrpSpPr>
+        <p:grpSpPr>
+          <a:xfrm>
+            <a:off x="-30778" y="3079832"/>
+            <a:ext cx="11041118" cy="1259760"/>
+            <a:chOff x="-30778" y="5598240"/>
+            <a:chExt cx="12222778" cy="1259760"/>
+          </a:xfrm>
+        </p:grpSpPr>
+        <p:sp>
+          <p:nvSpPr>
+            <p:cNvPr id="21" name="Rectangle 20">
+              <a:extLst>
+                <a:ext uri="{FF2B5EF4-FFF2-40B4-BE49-F238E27FC236}">
+                  <a16:creationId xmlns:a16="http://schemas.microsoft.com/office/drawing/2014/main" id="{6DA14D3A-133B-2CC1-9C1A-BBBAF49AC163}"/>
+                </a:ext>
+              </a:extLst>
+            </p:cNvPr>
+            <p:cNvSpPr/>
+            <p:nvPr/>
+          </p:nvSpPr>
+          <p:spPr>
+            <a:xfrm>
+              <a:off x="0" y="5598240"/>
+              <a:ext cx="12192000" cy="1259760"/>
+            </a:xfrm>
+            <a:prstGeom prst="rect">
+              <a:avLst/>
+            </a:prstGeom>
+            <a:solidFill>
+              <a:schemeClr val="accent5">
+                <a:alpha val="30000"/>
+              </a:schemeClr>
+            </a:solidFill>
+            <a:ln>
+              <a:noFill/>
+            </a:ln>
+          </p:spPr>
+          <p:style>
+            <a:lnRef idx="2">
+              <a:schemeClr val="accent1">
+                <a:shade val="15000"/>
+              </a:schemeClr>
+            </a:lnRef>
+            <a:fillRef idx="1">
+              <a:schemeClr val="accent1"/>
+            </a:fillRef>
+            <a:effectRef idx="0">
+              <a:schemeClr val="accent1"/>
+            </a:effectRef>
+            <a:fontRef idx="minor">
+              <a:schemeClr val="lt1"/>
+            </a:fontRef>
+          </p:style>
+          <p:txBody>
+            <a:bodyPr rtlCol="0" anchor="ctr"/>
+            <a:lstStyle/>
+            <a:p>
+              <a:pPr algn="ctr"/>
+              <a:endParaRPr lang="en-GB" dirty="0"/>
+            </a:p>
+          </p:txBody>
+        </p:sp>
+        <p:sp>
+          <p:nvSpPr>
+            <p:cNvPr id="22" name="TextBox 21">
+              <a:extLst>
+                <a:ext uri="{FF2B5EF4-FFF2-40B4-BE49-F238E27FC236}">
+                  <a16:creationId xmlns:a16="http://schemas.microsoft.com/office/drawing/2014/main" id="{C07E32C0-4F62-1E79-0F7D-9F3FE0C23820}"/>
+                </a:ext>
+              </a:extLst>
+            </p:cNvPr>
+            <p:cNvSpPr txBox="1"/>
+            <p:nvPr/>
+          </p:nvSpPr>
+          <p:spPr>
+            <a:xfrm>
+              <a:off x="-30778" y="5627955"/>
+              <a:ext cx="1394584" cy="1200329"/>
+            </a:xfrm>
+            <a:prstGeom prst="rect">
+              <a:avLst/>
+            </a:prstGeom>
+            <a:noFill/>
+          </p:spPr>
+          <p:txBody>
+            <a:bodyPr wrap="square" rtlCol="0">
+              <a:spAutoFit/>
+            </a:bodyPr>
+            <a:lstStyle/>
+            <a:p>
+              <a:pPr algn="ctr"/>
+              <a:r>
+                <a:rPr lang="en-GB" sz="2400" dirty="0"/>
+                <a:t>Middle-pipeline files</a:t>
+              </a:r>
+            </a:p>
+          </p:txBody>
+        </p:sp>
+      </p:grpSp>
+      <p:grpSp>
+        <p:nvGrpSpPr>
+          <p:cNvPr id="23" name="Group 22">
+            <a:extLst>
+              <a:ext uri="{FF2B5EF4-FFF2-40B4-BE49-F238E27FC236}">
+                <a16:creationId xmlns:a16="http://schemas.microsoft.com/office/drawing/2014/main" id="{0DDFC374-2BFB-150C-C693-901E61881CA7}"/>
+              </a:ext>
+            </a:extLst>
+          </p:cNvPr>
+          <p:cNvGrpSpPr/>
+          <p:nvPr/>
+        </p:nvGrpSpPr>
+        <p:grpSpPr>
+          <a:xfrm>
+            <a:off x="-30778" y="1821480"/>
+            <a:ext cx="11041118" cy="1259760"/>
+            <a:chOff x="-30778" y="5598240"/>
+            <a:chExt cx="12222778" cy="1259760"/>
+          </a:xfrm>
+        </p:grpSpPr>
+        <p:sp>
+          <p:nvSpPr>
+            <p:cNvPr id="24" name="Rectangle 23">
+              <a:extLst>
+                <a:ext uri="{FF2B5EF4-FFF2-40B4-BE49-F238E27FC236}">
+                  <a16:creationId xmlns:a16="http://schemas.microsoft.com/office/drawing/2014/main" id="{7585ADBE-427F-DBE0-DCE9-FE8B1F60B4F4}"/>
+                </a:ext>
+              </a:extLst>
+            </p:cNvPr>
+            <p:cNvSpPr/>
+            <p:nvPr/>
+          </p:nvSpPr>
+          <p:spPr>
+            <a:xfrm>
+              <a:off x="-1" y="5598240"/>
+              <a:ext cx="12192001" cy="1259760"/>
+            </a:xfrm>
+            <a:prstGeom prst="rect">
+              <a:avLst/>
+            </a:prstGeom>
+            <a:solidFill>
+              <a:schemeClr val="tx2">
+                <a:alpha val="30000"/>
+              </a:schemeClr>
+            </a:solidFill>
+            <a:ln>
+              <a:noFill/>
+            </a:ln>
+          </p:spPr>
+          <p:style>
+            <a:lnRef idx="2">
+              <a:schemeClr val="accent1">
+                <a:shade val="15000"/>
+              </a:schemeClr>
+            </a:lnRef>
+            <a:fillRef idx="1">
+              <a:schemeClr val="accent1"/>
+            </a:fillRef>
+            <a:effectRef idx="0">
+              <a:schemeClr val="accent1"/>
+            </a:effectRef>
+            <a:fontRef idx="minor">
+              <a:schemeClr val="lt1"/>
+            </a:fontRef>
+          </p:style>
+          <p:txBody>
+            <a:bodyPr rtlCol="0" anchor="ctr"/>
+            <a:lstStyle/>
+            <a:p>
+              <a:pPr algn="ctr"/>
+              <a:endParaRPr lang="en-GB" dirty="0"/>
+            </a:p>
+          </p:txBody>
+        </p:sp>
+        <p:sp>
+          <p:nvSpPr>
+            <p:cNvPr id="25" name="TextBox 24">
+              <a:extLst>
+                <a:ext uri="{FF2B5EF4-FFF2-40B4-BE49-F238E27FC236}">
+                  <a16:creationId xmlns:a16="http://schemas.microsoft.com/office/drawing/2014/main" id="{68C4F8B2-D9E6-13A3-84B4-5486AD17CA9C}"/>
+                </a:ext>
+              </a:extLst>
+            </p:cNvPr>
+            <p:cNvSpPr txBox="1"/>
+            <p:nvPr/>
+          </p:nvSpPr>
+          <p:spPr>
+            <a:xfrm>
+              <a:off x="-30778" y="5812622"/>
+              <a:ext cx="1394584" cy="830997"/>
+            </a:xfrm>
+            <a:prstGeom prst="rect">
+              <a:avLst/>
+            </a:prstGeom>
+            <a:noFill/>
+          </p:spPr>
+          <p:txBody>
+            <a:bodyPr wrap="square" rtlCol="0">
+              <a:spAutoFit/>
+            </a:bodyPr>
+            <a:lstStyle/>
+            <a:p>
+              <a:pPr algn="ctr"/>
+              <a:r>
+                <a:rPr lang="en-GB" sz="2400" dirty="0"/>
+                <a:t>Source files</a:t>
+              </a:r>
+            </a:p>
+          </p:txBody>
+        </p:sp>
+      </p:grpSp>
+      <p:grpSp>
+        <p:nvGrpSpPr>
+          <p:cNvPr id="26" name="Group 25">
+            <a:extLst>
+              <a:ext uri="{FF2B5EF4-FFF2-40B4-BE49-F238E27FC236}">
+                <a16:creationId xmlns:a16="http://schemas.microsoft.com/office/drawing/2014/main" id="{88AC920F-12B4-C792-AD09-E2091440A9A0}"/>
+              </a:ext>
+            </a:extLst>
+          </p:cNvPr>
+          <p:cNvGrpSpPr/>
+          <p:nvPr/>
+        </p:nvGrpSpPr>
+        <p:grpSpPr>
+          <a:xfrm>
+            <a:off x="-30326" y="833717"/>
+            <a:ext cx="11041119" cy="987761"/>
+            <a:chOff x="-30778" y="5598240"/>
+            <a:chExt cx="12222778" cy="1259760"/>
+          </a:xfrm>
+        </p:grpSpPr>
+        <p:sp>
+          <p:nvSpPr>
+            <p:cNvPr id="27" name="Rectangle 26">
+              <a:extLst>
+                <a:ext uri="{FF2B5EF4-FFF2-40B4-BE49-F238E27FC236}">
+                  <a16:creationId xmlns:a16="http://schemas.microsoft.com/office/drawing/2014/main" id="{C2DC8FD6-14EE-67C5-161A-E8511056C801}"/>
+                </a:ext>
+              </a:extLst>
+            </p:cNvPr>
+            <p:cNvSpPr/>
+            <p:nvPr/>
+          </p:nvSpPr>
+          <p:spPr>
+            <a:xfrm>
+              <a:off x="-1" y="5598240"/>
+              <a:ext cx="12192001" cy="1259760"/>
+            </a:xfrm>
+            <a:prstGeom prst="rect">
+              <a:avLst/>
+            </a:prstGeom>
+            <a:solidFill>
+              <a:schemeClr val="accent3">
+                <a:alpha val="30000"/>
+              </a:schemeClr>
+            </a:solidFill>
+            <a:ln>
+              <a:noFill/>
+            </a:ln>
+          </p:spPr>
+          <p:style>
+            <a:lnRef idx="2">
+              <a:schemeClr val="accent1">
+                <a:shade val="15000"/>
+              </a:schemeClr>
+            </a:lnRef>
+            <a:fillRef idx="1">
+              <a:schemeClr val="accent1"/>
+            </a:fillRef>
+            <a:effectRef idx="0">
+              <a:schemeClr val="accent1"/>
+            </a:effectRef>
+            <a:fontRef idx="minor">
+              <a:schemeClr val="lt1"/>
+            </a:fontRef>
+          </p:style>
+          <p:txBody>
+            <a:bodyPr rtlCol="0" anchor="ctr"/>
+            <a:lstStyle/>
+            <a:p>
+              <a:pPr algn="ctr"/>
+              <a:endParaRPr lang="en-GB" dirty="0"/>
+            </a:p>
+          </p:txBody>
+        </p:sp>
+        <p:sp>
+          <p:nvSpPr>
+            <p:cNvPr id="28" name="TextBox 27">
+              <a:extLst>
+                <a:ext uri="{FF2B5EF4-FFF2-40B4-BE49-F238E27FC236}">
+                  <a16:creationId xmlns:a16="http://schemas.microsoft.com/office/drawing/2014/main" id="{266B1946-1E50-519E-75C2-CB8F4C48567B}"/>
+                </a:ext>
+              </a:extLst>
+            </p:cNvPr>
+            <p:cNvSpPr txBox="1"/>
+            <p:nvPr/>
+          </p:nvSpPr>
+          <p:spPr>
+            <a:xfrm>
+              <a:off x="-30778" y="5997288"/>
+              <a:ext cx="1477532" cy="461665"/>
+            </a:xfrm>
+            <a:prstGeom prst="rect">
+              <a:avLst/>
+            </a:prstGeom>
+            <a:noFill/>
+          </p:spPr>
+          <p:txBody>
+            <a:bodyPr wrap="square" rtlCol="0">
+              <a:spAutoFit/>
+            </a:bodyPr>
+            <a:lstStyle/>
+            <a:p>
+              <a:pPr algn="ctr"/>
+              <a:r>
+                <a:rPr lang="en-GB" sz="2400" dirty="0"/>
+                <a:t>Sources</a:t>
+              </a:r>
+            </a:p>
+          </p:txBody>
+        </p:sp>
+      </p:grpSp>
+      <p:sp>
+        <p:nvSpPr>
+          <p:cNvPr id="30" name="Title 1">
+            <a:extLst>
+              <a:ext uri="{FF2B5EF4-FFF2-40B4-BE49-F238E27FC236}">
+                <a16:creationId xmlns:a16="http://schemas.microsoft.com/office/drawing/2014/main" id="{F3E681A9-52BE-A049-E3DB-CC911BC418D9}"/>
+              </a:ext>
+            </a:extLst>
+          </p:cNvPr>
+          <p:cNvSpPr txBox="1">
+            <a:spLocks/>
+          </p:cNvSpPr>
+          <p:nvPr/>
+        </p:nvSpPr>
+        <p:spPr>
+          <a:xfrm>
+            <a:off x="0" y="112618"/>
+            <a:ext cx="11010340" cy="721097"/>
+          </a:xfrm>
+          <a:prstGeom prst="rect">
+            <a:avLst/>
+          </a:prstGeom>
+        </p:spPr>
+        <p:txBody>
+          <a:bodyPr/>
+          <a:lstStyle>
+            <a:lvl1pPr algn="l" defTabSz="914400" rtl="0" eaLnBrk="1" latinLnBrk="0" hangingPunct="1">
+              <a:lnSpc>
+                <a:spcPct val="90000"/>
+              </a:lnSpc>
+              <a:spcBef>
+                <a:spcPct val="0"/>
+              </a:spcBef>
+              <a:buNone/>
+              <a:defRPr sz="4400" kern="1200">
+                <a:solidFill>
+                  <a:schemeClr val="tx1"/>
+                </a:solidFill>
+                <a:latin typeface="+mj-lt"/>
+                <a:ea typeface="+mj-ea"/>
+                <a:cs typeface="+mj-cs"/>
+              </a:defRPr>
+            </a:lvl1pPr>
+          </a:lstStyle>
+          <a:p>
+            <a:r>
+              <a:rPr lang="en-GB" dirty="0"/>
+              <a:t>Prototype - flowchart</a:t>
+            </a:r>
+          </a:p>
+        </p:txBody>
+      </p:sp>
+      <p:grpSp>
+        <p:nvGrpSpPr>
+          <p:cNvPr id="36" name="Group 35">
+            <a:extLst>
+              <a:ext uri="{FF2B5EF4-FFF2-40B4-BE49-F238E27FC236}">
+                <a16:creationId xmlns:a16="http://schemas.microsoft.com/office/drawing/2014/main" id="{2ADC70DC-4FBE-874D-52B8-B02C3F0B4C78}"/>
+              </a:ext>
+            </a:extLst>
+          </p:cNvPr>
+          <p:cNvGrpSpPr/>
+          <p:nvPr/>
+        </p:nvGrpSpPr>
+        <p:grpSpPr>
+          <a:xfrm>
+            <a:off x="1348372" y="836925"/>
+            <a:ext cx="2249089" cy="914400"/>
+            <a:chOff x="1564341" y="870397"/>
+            <a:chExt cx="2249089" cy="914400"/>
+          </a:xfrm>
+        </p:grpSpPr>
+        <p:pic>
+          <p:nvPicPr>
+            <p:cNvPr id="33" name="Graphic 32" descr="Database with solid fill">
+              <a:extLst>
+                <a:ext uri="{FF2B5EF4-FFF2-40B4-BE49-F238E27FC236}">
+                  <a16:creationId xmlns:a16="http://schemas.microsoft.com/office/drawing/2014/main" id="{06A5D898-8CE9-79BD-E25A-5D962270A634}"/>
+                </a:ext>
+              </a:extLst>
+            </p:cNvPr>
+            <p:cNvPicPr>
+              <a:picLocks noChangeAspect="1"/>
+            </p:cNvPicPr>
+            <p:nvPr/>
+          </p:nvPicPr>
+          <p:blipFill>
+            <a:blip r:embed="rId3">
+              <a:extLst>
+                <a:ext uri="{96DAC541-7B7A-43D3-8B79-37D633B846F1}">
+                  <asvg:svgBlip xmlns:asvg="http://schemas.microsoft.com/office/drawing/2016/SVG/main" r:embed="rId4"/>
+                </a:ext>
+              </a:extLst>
+            </a:blip>
+            <a:stretch>
+              <a:fillRect/>
+            </a:stretch>
+          </p:blipFill>
+          <p:spPr>
+            <a:xfrm>
+              <a:off x="1564341" y="870397"/>
+              <a:ext cx="914400" cy="914400"/>
+            </a:xfrm>
+            <a:prstGeom prst="rect">
+              <a:avLst/>
+            </a:prstGeom>
+          </p:spPr>
+        </p:pic>
+        <p:sp>
+          <p:nvSpPr>
+            <p:cNvPr id="34" name="TextBox 33">
+              <a:extLst>
+                <a:ext uri="{FF2B5EF4-FFF2-40B4-BE49-F238E27FC236}">
+                  <a16:creationId xmlns:a16="http://schemas.microsoft.com/office/drawing/2014/main" id="{DDAFED00-BAE1-C7D0-AE7B-E809045CA8F7}"/>
+                </a:ext>
+              </a:extLst>
+            </p:cNvPr>
+            <p:cNvSpPr txBox="1"/>
+            <p:nvPr/>
+          </p:nvSpPr>
+          <p:spPr>
+            <a:xfrm>
+              <a:off x="2478741" y="1078769"/>
+              <a:ext cx="1334689" cy="461665"/>
+            </a:xfrm>
+            <a:prstGeom prst="rect">
+              <a:avLst/>
+            </a:prstGeom>
+            <a:noFill/>
+          </p:spPr>
+          <p:txBody>
+            <a:bodyPr wrap="square" rtlCol="0">
+              <a:spAutoFit/>
+            </a:bodyPr>
+            <a:lstStyle/>
+            <a:p>
+              <a:pPr algn="ctr"/>
+              <a:r>
+                <a:rPr lang="en-GB" sz="2400" dirty="0"/>
+                <a:t>NCBI</a:t>
+              </a:r>
+            </a:p>
+          </p:txBody>
+        </p:sp>
+      </p:grpSp>
+      <p:grpSp>
+        <p:nvGrpSpPr>
+          <p:cNvPr id="38" name="Group 37">
+            <a:extLst>
+              <a:ext uri="{FF2B5EF4-FFF2-40B4-BE49-F238E27FC236}">
+                <a16:creationId xmlns:a16="http://schemas.microsoft.com/office/drawing/2014/main" id="{A60CB3DF-7321-CCB2-55A4-566824DC8C16}"/>
+              </a:ext>
+            </a:extLst>
+          </p:cNvPr>
+          <p:cNvGrpSpPr/>
+          <p:nvPr/>
+        </p:nvGrpSpPr>
+        <p:grpSpPr>
+          <a:xfrm>
+            <a:off x="3711150" y="855530"/>
+            <a:ext cx="2249089" cy="914400"/>
+            <a:chOff x="1564341" y="870397"/>
+            <a:chExt cx="2249089" cy="914400"/>
+          </a:xfrm>
+        </p:grpSpPr>
+        <p:pic>
+          <p:nvPicPr>
+            <p:cNvPr id="39" name="Graphic 38" descr="Database with solid fill">
+              <a:extLst>
+                <a:ext uri="{FF2B5EF4-FFF2-40B4-BE49-F238E27FC236}">
+                  <a16:creationId xmlns:a16="http://schemas.microsoft.com/office/drawing/2014/main" id="{2600356E-85E5-81C7-E9D9-E93695B13FDF}"/>
+                </a:ext>
+              </a:extLst>
+            </p:cNvPr>
+            <p:cNvPicPr>
+              <a:picLocks noChangeAspect="1"/>
+            </p:cNvPicPr>
+            <p:nvPr/>
+          </p:nvPicPr>
+          <p:blipFill>
+            <a:blip r:embed="rId3">
+              <a:extLst>
+                <a:ext uri="{96DAC541-7B7A-43D3-8B79-37D633B846F1}">
+                  <asvg:svgBlip xmlns:asvg="http://schemas.microsoft.com/office/drawing/2016/SVG/main" r:embed="rId4"/>
+                </a:ext>
+              </a:extLst>
+            </a:blip>
+            <a:stretch>
+              <a:fillRect/>
+            </a:stretch>
+          </p:blipFill>
+          <p:spPr>
+            <a:xfrm>
+              <a:off x="1564341" y="870397"/>
+              <a:ext cx="914400" cy="914400"/>
+            </a:xfrm>
+            <a:prstGeom prst="rect">
+              <a:avLst/>
+            </a:prstGeom>
+          </p:spPr>
+        </p:pic>
+        <p:sp>
+          <p:nvSpPr>
+            <p:cNvPr id="40" name="TextBox 39">
+              <a:extLst>
+                <a:ext uri="{FF2B5EF4-FFF2-40B4-BE49-F238E27FC236}">
+                  <a16:creationId xmlns:a16="http://schemas.microsoft.com/office/drawing/2014/main" id="{3EF15523-E8D6-49FB-D5E8-75134F310514}"/>
+                </a:ext>
+              </a:extLst>
+            </p:cNvPr>
+            <p:cNvSpPr txBox="1"/>
+            <p:nvPr/>
+          </p:nvSpPr>
+          <p:spPr>
+            <a:xfrm>
+              <a:off x="2478741" y="1078769"/>
+              <a:ext cx="1334689" cy="461665"/>
+            </a:xfrm>
+            <a:prstGeom prst="rect">
+              <a:avLst/>
+            </a:prstGeom>
+            <a:noFill/>
+          </p:spPr>
+          <p:txBody>
+            <a:bodyPr wrap="square" rtlCol="0">
+              <a:spAutoFit/>
+            </a:bodyPr>
+            <a:lstStyle/>
+            <a:p>
+              <a:pPr algn="ctr"/>
+              <a:r>
+                <a:rPr lang="en-GB" sz="2400" dirty="0"/>
+                <a:t>KEGG</a:t>
+              </a:r>
+            </a:p>
+          </p:txBody>
+        </p:sp>
+      </p:grpSp>
+      <p:grpSp>
+        <p:nvGrpSpPr>
+          <p:cNvPr id="48" name="Group 47">
+            <a:extLst>
+              <a:ext uri="{FF2B5EF4-FFF2-40B4-BE49-F238E27FC236}">
+                <a16:creationId xmlns:a16="http://schemas.microsoft.com/office/drawing/2014/main" id="{D45DC85F-336C-6FF9-EFF7-27AC86665B1F}"/>
+              </a:ext>
+            </a:extLst>
+          </p:cNvPr>
+          <p:cNvGrpSpPr/>
+          <p:nvPr/>
+        </p:nvGrpSpPr>
+        <p:grpSpPr>
+          <a:xfrm>
+            <a:off x="6073928" y="892740"/>
+            <a:ext cx="2384474" cy="914400"/>
+            <a:chOff x="7491972" y="878479"/>
+            <a:chExt cx="2384474" cy="914400"/>
+          </a:xfrm>
+        </p:grpSpPr>
+        <p:sp>
+          <p:nvSpPr>
+            <p:cNvPr id="43" name="TextBox 42">
+              <a:extLst>
+                <a:ext uri="{FF2B5EF4-FFF2-40B4-BE49-F238E27FC236}">
+                  <a16:creationId xmlns:a16="http://schemas.microsoft.com/office/drawing/2014/main" id="{AAA764A8-90F7-A3DD-66D6-10CFE41E885A}"/>
+                </a:ext>
+              </a:extLst>
+            </p:cNvPr>
+            <p:cNvSpPr txBox="1"/>
+            <p:nvPr/>
+          </p:nvSpPr>
+          <p:spPr>
+            <a:xfrm>
+              <a:off x="8406372" y="894102"/>
+              <a:ext cx="1470074" cy="830997"/>
+            </a:xfrm>
+            <a:prstGeom prst="rect">
+              <a:avLst/>
+            </a:prstGeom>
+            <a:noFill/>
+          </p:spPr>
+          <p:txBody>
+            <a:bodyPr wrap="square" rtlCol="0">
+              <a:spAutoFit/>
+            </a:bodyPr>
+            <a:lstStyle/>
+            <a:p>
+              <a:pPr algn="ctr"/>
+              <a:r>
+                <a:rPr lang="en-GB" sz="2400" dirty="0"/>
+                <a:t>Frog </a:t>
+              </a:r>
+            </a:p>
+            <a:p>
+              <a:pPr algn="ctr"/>
+              <a:r>
+                <a:rPr lang="en-GB" sz="2400" dirty="0"/>
+                <a:t>samples</a:t>
+              </a:r>
+            </a:p>
+          </p:txBody>
+        </p:sp>
+        <p:pic>
+          <p:nvPicPr>
+            <p:cNvPr id="47" name="Graphic 46" descr="Frog with solid fill">
+              <a:extLst>
+                <a:ext uri="{FF2B5EF4-FFF2-40B4-BE49-F238E27FC236}">
+                  <a16:creationId xmlns:a16="http://schemas.microsoft.com/office/drawing/2014/main" id="{5718CC39-EFEC-BB86-368C-D09CEAB3C859}"/>
+                </a:ext>
+              </a:extLst>
+            </p:cNvPr>
+            <p:cNvPicPr>
+              <a:picLocks noChangeAspect="1"/>
+            </p:cNvPicPr>
+            <p:nvPr/>
+          </p:nvPicPr>
+          <p:blipFill>
+            <a:blip r:embed="rId5">
+              <a:extLst>
+                <a:ext uri="{96DAC541-7B7A-43D3-8B79-37D633B846F1}">
+                  <asvg:svgBlip xmlns:asvg="http://schemas.microsoft.com/office/drawing/2016/SVG/main" r:embed="rId6"/>
+                </a:ext>
+              </a:extLst>
+            </a:blip>
+            <a:stretch>
+              <a:fillRect/>
+            </a:stretch>
+          </p:blipFill>
+          <p:spPr>
+            <a:xfrm>
+              <a:off x="7491972" y="878479"/>
+              <a:ext cx="914400" cy="914400"/>
+            </a:xfrm>
+            <a:prstGeom prst="rect">
+              <a:avLst/>
+            </a:prstGeom>
+          </p:spPr>
+        </p:pic>
+      </p:grpSp>
+      <p:sp>
+        <p:nvSpPr>
+          <p:cNvPr id="52" name="Rectangle 51">
+            <a:extLst>
+              <a:ext uri="{FF2B5EF4-FFF2-40B4-BE49-F238E27FC236}">
+                <a16:creationId xmlns:a16="http://schemas.microsoft.com/office/drawing/2014/main" id="{81B7B6A9-912D-4C9C-02DD-1617FE4BA097}"/>
+              </a:ext>
+            </a:extLst>
+          </p:cNvPr>
+          <p:cNvSpPr/>
+          <p:nvPr/>
+        </p:nvSpPr>
+        <p:spPr>
+          <a:xfrm>
+            <a:off x="0" y="854481"/>
+            <a:ext cx="1297081" cy="6003519"/>
+          </a:xfrm>
+          <a:prstGeom prst="rect">
+            <a:avLst/>
+          </a:prstGeom>
+          <a:noFill/>
+          <a:ln w="25400">
+            <a:solidFill>
+              <a:srgbClr val="FF0000"/>
+            </a:solidFill>
+            <a:prstDash val="dash"/>
+          </a:ln>
+        </p:spPr>
+        <p:style>
+          <a:lnRef idx="2">
+            <a:schemeClr val="accent1">
+              <a:shade val="15000"/>
+            </a:schemeClr>
+          </a:lnRef>
+          <a:fillRef idx="1">
+            <a:schemeClr val="accent1"/>
+          </a:fillRef>
+          <a:effectRef idx="0">
+            <a:schemeClr val="accent1"/>
+          </a:effectRef>
+          <a:fontRef idx="minor">
+            <a:schemeClr val="lt1"/>
+          </a:fontRef>
+        </p:style>
+        <p:txBody>
+          <a:bodyPr rtlCol="0" anchor="ctr"/>
+          <a:lstStyle/>
+          <a:p>
+            <a:pPr algn="ctr"/>
+            <a:endParaRPr lang="en-GB"/>
+          </a:p>
+        </p:txBody>
+      </p:sp>
+      <p:grpSp>
+        <p:nvGrpSpPr>
+          <p:cNvPr id="55" name="Group 54">
+            <a:extLst>
+              <a:ext uri="{FF2B5EF4-FFF2-40B4-BE49-F238E27FC236}">
+                <a16:creationId xmlns:a16="http://schemas.microsoft.com/office/drawing/2014/main" id="{DEBA22C4-D568-DD18-36A5-33B794605472}"/>
+              </a:ext>
+            </a:extLst>
+          </p:cNvPr>
+          <p:cNvGrpSpPr/>
+          <p:nvPr/>
+        </p:nvGrpSpPr>
+        <p:grpSpPr>
+          <a:xfrm>
+            <a:off x="8572092" y="874135"/>
+            <a:ext cx="2398375" cy="914400"/>
+            <a:chOff x="8572092" y="843425"/>
+            <a:chExt cx="2398375" cy="914400"/>
+          </a:xfrm>
+        </p:grpSpPr>
+        <p:sp>
+          <p:nvSpPr>
+            <p:cNvPr id="50" name="TextBox 49">
+              <a:extLst>
+                <a:ext uri="{FF2B5EF4-FFF2-40B4-BE49-F238E27FC236}">
+                  <a16:creationId xmlns:a16="http://schemas.microsoft.com/office/drawing/2014/main" id="{81266304-8AC8-DCEA-BA15-B3599C220DCE}"/>
+                </a:ext>
+              </a:extLst>
+            </p:cNvPr>
+            <p:cNvSpPr txBox="1"/>
+            <p:nvPr/>
+          </p:nvSpPr>
+          <p:spPr>
+            <a:xfrm>
+              <a:off x="9500393" y="878627"/>
+              <a:ext cx="1470074" cy="830997"/>
+            </a:xfrm>
+            <a:prstGeom prst="rect">
+              <a:avLst/>
+            </a:prstGeom>
+            <a:noFill/>
+          </p:spPr>
+          <p:txBody>
+            <a:bodyPr wrap="square" rtlCol="0">
+              <a:spAutoFit/>
+            </a:bodyPr>
+            <a:lstStyle/>
+            <a:p>
+              <a:pPr algn="ctr"/>
+              <a:r>
+                <a:rPr lang="en-GB" sz="2400" dirty="0"/>
+                <a:t>Fly</a:t>
+              </a:r>
+            </a:p>
+            <a:p>
+              <a:pPr algn="ctr"/>
+              <a:r>
+                <a:rPr lang="en-GB" sz="2400" dirty="0"/>
+                <a:t>samples</a:t>
+              </a:r>
+            </a:p>
+          </p:txBody>
+        </p:sp>
+        <p:pic>
+          <p:nvPicPr>
+            <p:cNvPr id="54" name="Graphic 53" descr="Bug under magnifying glass with solid fill">
+              <a:extLst>
+                <a:ext uri="{FF2B5EF4-FFF2-40B4-BE49-F238E27FC236}">
+                  <a16:creationId xmlns:a16="http://schemas.microsoft.com/office/drawing/2014/main" id="{88743398-8E15-DA9E-F6F5-7E857D9BF073}"/>
+                </a:ext>
+              </a:extLst>
+            </p:cNvPr>
+            <p:cNvPicPr>
+              <a:picLocks noChangeAspect="1"/>
+            </p:cNvPicPr>
+            <p:nvPr/>
+          </p:nvPicPr>
+          <p:blipFill>
+            <a:blip r:embed="rId7">
+              <a:extLst>
+                <a:ext uri="{96DAC541-7B7A-43D3-8B79-37D633B846F1}">
+                  <asvg:svgBlip xmlns:asvg="http://schemas.microsoft.com/office/drawing/2016/SVG/main" r:embed="rId8"/>
+                </a:ext>
+              </a:extLst>
+            </a:blip>
+            <a:stretch>
+              <a:fillRect/>
+            </a:stretch>
+          </p:blipFill>
+          <p:spPr>
+            <a:xfrm>
+              <a:off x="8572092" y="843425"/>
+              <a:ext cx="914400" cy="914400"/>
+            </a:xfrm>
+            <a:prstGeom prst="rect">
+              <a:avLst/>
+            </a:prstGeom>
+          </p:spPr>
+        </p:pic>
+      </p:grpSp>
+      <p:cxnSp>
+        <p:nvCxnSpPr>
+          <p:cNvPr id="57" name="Straight Connector 56">
+            <a:extLst>
+              <a:ext uri="{FF2B5EF4-FFF2-40B4-BE49-F238E27FC236}">
+                <a16:creationId xmlns:a16="http://schemas.microsoft.com/office/drawing/2014/main" id="{F294AC59-2282-4F2E-ADA5-98D95C3B3468}"/>
+              </a:ext>
+            </a:extLst>
+          </p:cNvPr>
+          <p:cNvCxnSpPr>
+            <a:cxnSpLocks/>
+          </p:cNvCxnSpPr>
+          <p:nvPr/>
+        </p:nvCxnSpPr>
+        <p:spPr>
+          <a:xfrm>
+            <a:off x="3597461" y="839619"/>
+            <a:ext cx="0" cy="981859"/>
+          </a:xfrm>
+          <a:prstGeom prst="line">
+            <a:avLst/>
+          </a:prstGeom>
+          <a:ln>
+            <a:solidFill>
+              <a:schemeClr val="bg1">
+                <a:lumMod val="75000"/>
+              </a:schemeClr>
+            </a:solidFill>
+          </a:ln>
+        </p:spPr>
+        <p:style>
+          <a:lnRef idx="2">
+            <a:schemeClr val="accent1"/>
+          </a:lnRef>
+          <a:fillRef idx="0">
+            <a:schemeClr val="accent1"/>
+          </a:fillRef>
+          <a:effectRef idx="1">
+            <a:schemeClr val="accent1"/>
+          </a:effectRef>
+          <a:fontRef idx="minor">
+            <a:schemeClr val="tx1"/>
+          </a:fontRef>
+        </p:style>
+      </p:cxnSp>
+      <p:cxnSp>
+        <p:nvCxnSpPr>
+          <p:cNvPr id="58" name="Straight Connector 57">
+            <a:extLst>
+              <a:ext uri="{FF2B5EF4-FFF2-40B4-BE49-F238E27FC236}">
+                <a16:creationId xmlns:a16="http://schemas.microsoft.com/office/drawing/2014/main" id="{B53640FB-8B27-F5A5-6E95-82380401A4FE}"/>
+              </a:ext>
+            </a:extLst>
+          </p:cNvPr>
+          <p:cNvCxnSpPr>
+            <a:cxnSpLocks/>
+          </p:cNvCxnSpPr>
+          <p:nvPr/>
+        </p:nvCxnSpPr>
+        <p:spPr>
+          <a:xfrm>
+            <a:off x="5861049" y="842042"/>
+            <a:ext cx="0" cy="1059555"/>
+          </a:xfrm>
+          <a:prstGeom prst="line">
+            <a:avLst/>
+          </a:prstGeom>
+          <a:ln>
+            <a:solidFill>
+              <a:schemeClr val="bg1">
+                <a:lumMod val="75000"/>
+              </a:schemeClr>
+            </a:solidFill>
+          </a:ln>
+        </p:spPr>
+        <p:style>
+          <a:lnRef idx="2">
+            <a:schemeClr val="accent1"/>
+          </a:lnRef>
+          <a:fillRef idx="0">
+            <a:schemeClr val="accent1"/>
+          </a:fillRef>
+          <a:effectRef idx="1">
+            <a:schemeClr val="accent1"/>
+          </a:effectRef>
+          <a:fontRef idx="minor">
+            <a:schemeClr val="tx1"/>
+          </a:fontRef>
+        </p:style>
+      </p:cxnSp>
+      <p:cxnSp>
+        <p:nvCxnSpPr>
+          <p:cNvPr id="59" name="Straight Connector 58">
+            <a:extLst>
+              <a:ext uri="{FF2B5EF4-FFF2-40B4-BE49-F238E27FC236}">
+                <a16:creationId xmlns:a16="http://schemas.microsoft.com/office/drawing/2014/main" id="{013BE9D1-553D-6890-9194-92C6D84DAFDD}"/>
+              </a:ext>
+            </a:extLst>
+          </p:cNvPr>
+          <p:cNvCxnSpPr>
+            <a:cxnSpLocks/>
+          </p:cNvCxnSpPr>
+          <p:nvPr/>
+        </p:nvCxnSpPr>
+        <p:spPr>
+          <a:xfrm>
+            <a:off x="8458402" y="839618"/>
+            <a:ext cx="0" cy="981860"/>
+          </a:xfrm>
+          <a:prstGeom prst="line">
+            <a:avLst/>
+          </a:prstGeom>
+          <a:ln>
+            <a:solidFill>
+              <a:schemeClr val="bg1">
+                <a:lumMod val="75000"/>
+              </a:schemeClr>
+            </a:solidFill>
+          </a:ln>
+        </p:spPr>
+        <p:style>
+          <a:lnRef idx="2">
+            <a:schemeClr val="accent1"/>
+          </a:lnRef>
+          <a:fillRef idx="0">
+            <a:schemeClr val="accent1"/>
+          </a:fillRef>
+          <a:effectRef idx="1">
+            <a:schemeClr val="accent1"/>
+          </a:effectRef>
+          <a:fontRef idx="minor">
+            <a:schemeClr val="tx1"/>
+          </a:fontRef>
+        </p:style>
+      </p:cxnSp>
+    </p:spTree>
+    <p:extLst>
+      <p:ext uri="{BB962C8B-B14F-4D97-AF65-F5344CB8AC3E}">
+        <p14:creationId xmlns:p14="http://schemas.microsoft.com/office/powerpoint/2010/main" val="772923527"/>
+      </p:ext>
+    </p:extLst>
+  </p:cSld>
+  <p:clrMapOvr>
+    <a:masterClrMapping/>
+  </p:clrMapOvr>
+</p:sld>
+</file>
+
+<file path=ppt/slides/slide5.xml><?xml version="1.0" encoding="utf-8"?>
+<p:sld xmlns:a="http://schemas.openxmlformats.org/drawingml/2006/main" xmlns:r="http://schemas.openxmlformats.org/officeDocument/2006/relationships" xmlns:p="http://schemas.openxmlformats.org/presentationml/2006/main">
+  <p:cSld>
+    <p:spTree>
+      <p:nvGrpSpPr>
+        <p:cNvPr id="1" name=""/>
+        <p:cNvGrpSpPr/>
+        <p:nvPr/>
+      </p:nvGrpSpPr>
+      <p:grpSpPr>
+        <a:xfrm>
+          <a:off x="0" y="0"/>
+          <a:ext cx="0" cy="0"/>
+          <a:chOff x="0" y="0"/>
+          <a:chExt cx="0" cy="0"/>
+        </a:xfrm>
+      </p:grpSpPr>
+      <p:sp>
+        <p:nvSpPr>
+          <p:cNvPr id="2" name="Title 1">
+            <a:extLst>
+              <a:ext uri="{FF2B5EF4-FFF2-40B4-BE49-F238E27FC236}">
+                <a16:creationId xmlns:a16="http://schemas.microsoft.com/office/drawing/2014/main" id="{ACBA3DF1-D0CC-3955-6C6F-4C9DBE39DA1F}"/>
+              </a:ext>
+            </a:extLst>
+          </p:cNvPr>
+          <p:cNvSpPr>
+            <a:spLocks noGrp="1"/>
+          </p:cNvSpPr>
+          <p:nvPr>
+            <p:ph type="title"/>
+          </p:nvPr>
+        </p:nvSpPr>
+        <p:spPr/>
+        <p:txBody>
+          <a:bodyPr/>
+          <a:lstStyle/>
+          <a:p>
+            <a:r>
+              <a:rPr lang="en-GB" dirty="0"/>
+              <a:t>Complex common things</a:t>
+            </a:r>
+          </a:p>
+        </p:txBody>
+      </p:sp>
+      <p:sp>
+        <p:nvSpPr>
+          <p:cNvPr id="3" name="Content Placeholder 2">
+            <a:extLst>
+              <a:ext uri="{FF2B5EF4-FFF2-40B4-BE49-F238E27FC236}">
+                <a16:creationId xmlns:a16="http://schemas.microsoft.com/office/drawing/2014/main" id="{2FE5714D-7EFC-7C11-204D-2DE454049FAA}"/>
+              </a:ext>
+            </a:extLst>
+          </p:cNvPr>
+          <p:cNvSpPr>
+            <a:spLocks noGrp="1"/>
+          </p:cNvSpPr>
+          <p:nvPr>
+            <p:ph idx="1"/>
+          </p:nvPr>
+        </p:nvSpPr>
+        <p:spPr/>
+        <p:txBody>
+          <a:bodyPr/>
+          <a:lstStyle/>
+          <a:p>
+            <a:r>
+              <a:rPr lang="en-GB" dirty="0"/>
+              <a:t>API call – non-computer experts won’t know what this means, and that is ok. An API call is basically running commands on a database from a code file. In R I do this with the package httr2(look it up). I pass in a URL with the command I want to use, (i.e. pull file down*).</a:t>
+            </a:r>
+          </a:p>
+          <a:p>
+            <a:r>
+              <a:rPr lang="en-GB" dirty="0"/>
+              <a:t>KEGG pathways and map IDs – [</a:t>
+            </a:r>
+            <a:r>
+              <a:rPr lang="en-GB" dirty="0">
+                <a:highlight>
+                  <a:srgbClr val="FFFF00"/>
+                </a:highlight>
+              </a:rPr>
+              <a:t>explain</a:t>
+            </a:r>
+            <a:r>
+              <a:rPr lang="en-GB" dirty="0"/>
+              <a:t>]</a:t>
+            </a:r>
+          </a:p>
+        </p:txBody>
+      </p:sp>
+      <p:sp>
+        <p:nvSpPr>
+          <p:cNvPr id="4" name="TextBox 3">
+            <a:extLst>
+              <a:ext uri="{FF2B5EF4-FFF2-40B4-BE49-F238E27FC236}">
+                <a16:creationId xmlns:a16="http://schemas.microsoft.com/office/drawing/2014/main" id="{FF8ED6D5-FD3B-4B7D-5796-4E9BC607DA6F}"/>
+              </a:ext>
+            </a:extLst>
+          </p:cNvPr>
+          <p:cNvSpPr txBox="1"/>
+          <p:nvPr/>
+        </p:nvSpPr>
+        <p:spPr>
+          <a:xfrm>
+            <a:off x="79513" y="6341165"/>
+            <a:ext cx="12052852" cy="261610"/>
+          </a:xfrm>
+          <a:prstGeom prst="rect">
+            <a:avLst/>
+          </a:prstGeom>
+          <a:noFill/>
+        </p:spPr>
+        <p:txBody>
+          <a:bodyPr wrap="square" rtlCol="0">
+            <a:spAutoFit/>
+          </a:bodyPr>
+          <a:lstStyle/>
+          <a:p>
+            <a:r>
+              <a:rPr lang="en-GB" sz="1100" dirty="0"/>
+              <a:t>* Exact command I used is seen in </a:t>
+            </a:r>
+            <a:r>
+              <a:rPr lang="en-GB" sz="1100" dirty="0" err="1"/>
+              <a:t>Notebook.R</a:t>
+            </a:r>
+            <a:r>
+              <a:rPr lang="en-GB" sz="1100" dirty="0"/>
+              <a:t>, as is a link to the NCBI REST API to see the full list of things that can be done</a:t>
+            </a:r>
+          </a:p>
+        </p:txBody>
+      </p:sp>
+    </p:spTree>
+    <p:extLst>
+      <p:ext uri="{BB962C8B-B14F-4D97-AF65-F5344CB8AC3E}">
+        <p14:creationId xmlns:p14="http://schemas.microsoft.com/office/powerpoint/2010/main" val="2970219512"/>
+      </p:ext>
+    </p:extLst>
+  </p:cSld>
+  <p:clrMapOvr>
+    <a:masterClrMapping/>
+  </p:clrMapOvr>
+</p:sld>
+</file>
+
+<file path=ppt/slides/slide6.xml><?xml version="1.0" encoding="utf-8"?>
+<p:sld xmlns:a="http://schemas.openxmlformats.org/drawingml/2006/main" xmlns:r="http://schemas.openxmlformats.org/officeDocument/2006/relationships" xmlns:p="http://schemas.openxmlformats.org/presentationml/2006/main" show="0">
+  <p:cSld>
+    <p:spTree>
+      <p:nvGrpSpPr>
         <p:cNvPr id="1" name=""/>
         <p:cNvGrpSpPr/>
         <p:nvPr/>
@@ -6560,153 +10753,6 @@
       <p:bldP spid="108" grpId="0" animBg="1"/>
     </p:bldLst>
   </p:timing>
-</p:sld>
-</file>
-
-<file path=ppt/slides/slide4.xml><?xml version="1.0" encoding="utf-8"?>
-<p:sld xmlns:a="http://schemas.openxmlformats.org/drawingml/2006/main" xmlns:r="http://schemas.openxmlformats.org/officeDocument/2006/relationships" xmlns:p="http://schemas.openxmlformats.org/presentationml/2006/main">
-  <p:cSld>
-    <p:spTree>
-      <p:nvGrpSpPr>
-        <p:cNvPr id="1" name=""/>
-        <p:cNvGrpSpPr/>
-        <p:nvPr/>
-      </p:nvGrpSpPr>
-      <p:grpSpPr>
-        <a:xfrm>
-          <a:off x="0" y="0"/>
-          <a:ext cx="0" cy="0"/>
-          <a:chOff x="0" y="0"/>
-          <a:chExt cx="0" cy="0"/>
-        </a:xfrm>
-      </p:grpSpPr>
-      <p:sp>
-        <p:nvSpPr>
-          <p:cNvPr id="2" name="Title 1">
-            <a:extLst>
-              <a:ext uri="{FF2B5EF4-FFF2-40B4-BE49-F238E27FC236}">
-                <a16:creationId xmlns:a16="http://schemas.microsoft.com/office/drawing/2014/main" id="{ACBA3DF1-D0CC-3955-6C6F-4C9DBE39DA1F}"/>
-              </a:ext>
-            </a:extLst>
-          </p:cNvPr>
-          <p:cNvSpPr>
-            <a:spLocks noGrp="1"/>
-          </p:cNvSpPr>
-          <p:nvPr>
-            <p:ph type="title"/>
-          </p:nvPr>
-        </p:nvSpPr>
-        <p:spPr/>
-        <p:txBody>
-          <a:bodyPr/>
-          <a:lstStyle/>
-          <a:p>
-            <a:r>
-              <a:rPr lang="en-GB" dirty="0"/>
-              <a:t>Complex common things</a:t>
-            </a:r>
-          </a:p>
-        </p:txBody>
-      </p:sp>
-      <p:sp>
-        <p:nvSpPr>
-          <p:cNvPr id="3" name="Content Placeholder 2">
-            <a:extLst>
-              <a:ext uri="{FF2B5EF4-FFF2-40B4-BE49-F238E27FC236}">
-                <a16:creationId xmlns:a16="http://schemas.microsoft.com/office/drawing/2014/main" id="{2FE5714D-7EFC-7C11-204D-2DE454049FAA}"/>
-              </a:ext>
-            </a:extLst>
-          </p:cNvPr>
-          <p:cNvSpPr>
-            <a:spLocks noGrp="1"/>
-          </p:cNvSpPr>
-          <p:nvPr>
-            <p:ph idx="1"/>
-          </p:nvPr>
-        </p:nvSpPr>
-        <p:spPr/>
-        <p:txBody>
-          <a:bodyPr/>
-          <a:lstStyle/>
-          <a:p>
-            <a:r>
-              <a:rPr lang="en-GB" dirty="0"/>
-              <a:t>API call – non-computer experts won’t know what this means, and that is ok. An API call is basically running commands on a database from a code file. In R I do this with the package httr2(look it up). I pass in a URL with the command I want to use, (i.e. pull file down*).</a:t>
-            </a:r>
-          </a:p>
-          <a:p>
-            <a:r>
-              <a:rPr lang="en-GB" dirty="0"/>
-              <a:t>KEGG pathways and map IDs – [</a:t>
-            </a:r>
-            <a:r>
-              <a:rPr lang="en-GB" dirty="0">
-                <a:highlight>
-                  <a:srgbClr val="FFFF00"/>
-                </a:highlight>
-              </a:rPr>
-              <a:t>explain</a:t>
-            </a:r>
-            <a:r>
-              <a:rPr lang="en-GB" dirty="0"/>
-              <a:t>]</a:t>
-            </a:r>
-          </a:p>
-        </p:txBody>
-      </p:sp>
-      <p:sp>
-        <p:nvSpPr>
-          <p:cNvPr id="4" name="TextBox 3">
-            <a:extLst>
-              <a:ext uri="{FF2B5EF4-FFF2-40B4-BE49-F238E27FC236}">
-                <a16:creationId xmlns:a16="http://schemas.microsoft.com/office/drawing/2014/main" id="{FF8ED6D5-FD3B-4B7D-5796-4E9BC607DA6F}"/>
-              </a:ext>
-            </a:extLst>
-          </p:cNvPr>
-          <p:cNvSpPr txBox="1"/>
-          <p:nvPr/>
-        </p:nvSpPr>
-        <p:spPr>
-          <a:xfrm>
-            <a:off x="79513" y="6341165"/>
-            <a:ext cx="12052852" cy="261610"/>
-          </a:xfrm>
-          <a:prstGeom prst="rect">
-            <a:avLst/>
-          </a:prstGeom>
-          <a:noFill/>
-        </p:spPr>
-        <p:txBody>
-          <a:bodyPr wrap="square" rtlCol="0">
-            <a:spAutoFit/>
-          </a:bodyPr>
-          <a:lstStyle/>
-          <a:p>
-            <a:r>
-              <a:rPr lang="en-GB" sz="1100" dirty="0"/>
-              <a:t>* Exact command I used is seen in </a:t>
-            </a:r>
-            <a:r>
-              <a:rPr lang="en-GB" sz="1100" dirty="0" err="1"/>
-              <a:t>Notebook.R</a:t>
-            </a:r>
-            <a:r>
-              <a:rPr lang="en-GB" sz="1100" dirty="0"/>
-              <a:t>, as is a link to the NCBI REST API to see the full list of things that can be done</a:t>
-            </a:r>
-          </a:p>
-        </p:txBody>
-      </p:sp>
-    </p:spTree>
-    <p:extLst>
-      <p:ext uri="{BB962C8B-B14F-4D97-AF65-F5344CB8AC3E}">
-        <p14:creationId xmlns:p14="http://schemas.microsoft.com/office/powerpoint/2010/main" val="2970219512"/>
-      </p:ext>
-    </p:extLst>
-  </p:cSld>
-  <p:clrMapOvr>
-    <a:masterClrMapping/>
-  </p:clrMapOvr>
 </p:sld>
 </file>
 
@@ -7023,4 +11069,319 @@
     </a:ext>
   </a:extLst>
 </a:theme>
+</file>
+
+<file path=ppt/theme/theme2.xml><?xml version="1.0" encoding="utf-8"?>
+<a:theme xmlns:a="http://schemas.openxmlformats.org/drawingml/2006/main" name="Office Theme">
+  <a:themeElements>
+    <a:clrScheme name="Office">
+      <a:dk1>
+        <a:sysClr val="windowText" lastClr="000000"/>
+      </a:dk1>
+      <a:lt1>
+        <a:sysClr val="window" lastClr="FFFFFF"/>
+      </a:lt1>
+      <a:dk2>
+        <a:srgbClr val="0E2841"/>
+      </a:dk2>
+      <a:lt2>
+        <a:srgbClr val="E8E8E8"/>
+      </a:lt2>
+      <a:accent1>
+        <a:srgbClr val="156082"/>
+      </a:accent1>
+      <a:accent2>
+        <a:srgbClr val="E97132"/>
+      </a:accent2>
+      <a:accent3>
+        <a:srgbClr val="196B24"/>
+      </a:accent3>
+      <a:accent4>
+        <a:srgbClr val="0F9ED5"/>
+      </a:accent4>
+      <a:accent5>
+        <a:srgbClr val="A02B93"/>
+      </a:accent5>
+      <a:accent6>
+        <a:srgbClr val="4EA72E"/>
+      </a:accent6>
+      <a:hlink>
+        <a:srgbClr val="467886"/>
+      </a:hlink>
+      <a:folHlink>
+        <a:srgbClr val="96607D"/>
+      </a:folHlink>
+    </a:clrScheme>
+    <a:fontScheme name="Office">
+      <a:majorFont>
+        <a:latin typeface="Aptos Display" panose="02110004020202020204"/>
+        <a:ea typeface=""/>
+        <a:cs typeface=""/>
+        <a:font script="Jpan" typeface="游ゴシック Light"/>
+        <a:font script="Hang" typeface="맑은 고딕"/>
+        <a:font script="Hans" typeface="等线 Light"/>
+        <a:font script="Hant" typeface="新細明體"/>
+        <a:font script="Arab" typeface="Times New Roman"/>
+        <a:font script="Hebr" typeface="Times New Roman"/>
+        <a:font script="Thai" typeface="Angsana New"/>
+        <a:font script="Ethi" typeface="Nyala"/>
+        <a:font script="Beng" typeface="Vrinda"/>
+        <a:font script="Gujr" typeface="Shruti"/>
+        <a:font script="Khmr" typeface="MoolBoran"/>
+        <a:font script="Knda" typeface="Tunga"/>
+        <a:font script="Guru" typeface="Raavi"/>
+        <a:font script="Cans" typeface="Euphemia"/>
+        <a:font script="Cher" typeface="Plantagenet Cherokee"/>
+        <a:font script="Yiii" typeface="Microsoft Yi Baiti"/>
+        <a:font script="Tibt" typeface="Microsoft Himalaya"/>
+        <a:font script="Thaa" typeface="MV Boli"/>
+        <a:font script="Deva" typeface="Mangal"/>
+        <a:font script="Telu" typeface="Gautami"/>
+        <a:font script="Taml" typeface="Latha"/>
+        <a:font script="Syrc" typeface="Estrangelo Edessa"/>
+        <a:font script="Orya" typeface="Kalinga"/>
+        <a:font script="Mlym" typeface="Kartika"/>
+        <a:font script="Laoo" typeface="DokChampa"/>
+        <a:font script="Sinh" typeface="Iskoola Pota"/>
+        <a:font script="Mong" typeface="Mongolian Baiti"/>
+        <a:font script="Viet" typeface="Times New Roman"/>
+        <a:font script="Uigh" typeface="Microsoft Uighur"/>
+        <a:font script="Geor" typeface="Sylfaen"/>
+        <a:font script="Armn" typeface="Arial"/>
+        <a:font script="Bugi" typeface="Leelawadee UI"/>
+        <a:font script="Bopo" typeface="Microsoft JhengHei"/>
+        <a:font script="Java" typeface="Javanese Text"/>
+        <a:font script="Lisu" typeface="Segoe UI"/>
+        <a:font script="Mymr" typeface="Myanmar Text"/>
+        <a:font script="Nkoo" typeface="Ebrima"/>
+        <a:font script="Olck" typeface="Nirmala UI"/>
+        <a:font script="Osma" typeface="Ebrima"/>
+        <a:font script="Phag" typeface="Phagspa"/>
+        <a:font script="Syrn" typeface="Estrangelo Edessa"/>
+        <a:font script="Syrj" typeface="Estrangelo Edessa"/>
+        <a:font script="Syre" typeface="Estrangelo Edessa"/>
+        <a:font script="Sora" typeface="Nirmala UI"/>
+        <a:font script="Tale" typeface="Microsoft Tai Le"/>
+        <a:font script="Talu" typeface="Microsoft New Tai Lue"/>
+        <a:font script="Tfng" typeface="Ebrima"/>
+      </a:majorFont>
+      <a:minorFont>
+        <a:latin typeface="Aptos" panose="02110004020202020204"/>
+        <a:ea typeface=""/>
+        <a:cs typeface=""/>
+        <a:font script="Jpan" typeface="游ゴシック"/>
+        <a:font script="Hang" typeface="맑은 고딕"/>
+        <a:font script="Hans" typeface="等线"/>
+        <a:font script="Hant" typeface="新細明體"/>
+        <a:font script="Arab" typeface="Arial"/>
+        <a:font script="Hebr" typeface="Arial"/>
+        <a:font script="Thai" typeface="Cordia New"/>
+        <a:font script="Ethi" typeface="Nyala"/>
+        <a:font script="Beng" typeface="Vrinda"/>
+        <a:font script="Gujr" typeface="Shruti"/>
+        <a:font script="Khmr" typeface="DaunPenh"/>
+        <a:font script="Knda" typeface="Tunga"/>
+        <a:font script="Guru" typeface="Raavi"/>
+        <a:font script="Cans" typeface="Euphemia"/>
+        <a:font script="Cher" typeface="Plantagenet Cherokee"/>
+        <a:font script="Yiii" typeface="Microsoft Yi Baiti"/>
+        <a:font script="Tibt" typeface="Microsoft Himalaya"/>
+        <a:font script="Thaa" typeface="MV Boli"/>
+        <a:font script="Deva" typeface="Mangal"/>
+        <a:font script="Telu" typeface="Gautami"/>
+        <a:font script="Taml" typeface="Latha"/>
+        <a:font script="Syrc" typeface="Estrangelo Edessa"/>
+        <a:font script="Orya" typeface="Kalinga"/>
+        <a:font script="Mlym" typeface="Kartika"/>
+        <a:font script="Laoo" typeface="DokChampa"/>
+        <a:font script="Sinh" typeface="Iskoola Pota"/>
+        <a:font script="Mong" typeface="Mongolian Baiti"/>
+        <a:font script="Viet" typeface="Arial"/>
+        <a:font script="Uigh" typeface="Microsoft Uighur"/>
+        <a:font script="Geor" typeface="Sylfaen"/>
+        <a:font script="Armn" typeface="Arial"/>
+        <a:font script="Bugi" typeface="Leelawadee UI"/>
+        <a:font script="Bopo" typeface="Microsoft JhengHei"/>
+        <a:font script="Java" typeface="Javanese Text"/>
+        <a:font script="Lisu" typeface="Segoe UI"/>
+        <a:font script="Mymr" typeface="Myanmar Text"/>
+        <a:font script="Nkoo" typeface="Ebrima"/>
+        <a:font script="Olck" typeface="Nirmala UI"/>
+        <a:font script="Osma" typeface="Ebrima"/>
+        <a:font script="Phag" typeface="Phagspa"/>
+        <a:font script="Syrn" typeface="Estrangelo Edessa"/>
+        <a:font script="Syrj" typeface="Estrangelo Edessa"/>
+        <a:font script="Syre" typeface="Estrangelo Edessa"/>
+        <a:font script="Sora" typeface="Nirmala UI"/>
+        <a:font script="Tale" typeface="Microsoft Tai Le"/>
+        <a:font script="Talu" typeface="Microsoft New Tai Lue"/>
+        <a:font script="Tfng" typeface="Ebrima"/>
+      </a:minorFont>
+    </a:fontScheme>
+    <a:fmtScheme name="Office">
+      <a:fillStyleLst>
+        <a:solidFill>
+          <a:schemeClr val="phClr"/>
+        </a:solidFill>
+        <a:gradFill rotWithShape="1">
+          <a:gsLst>
+            <a:gs pos="0">
+              <a:schemeClr val="phClr">
+                <a:lumMod val="110000"/>
+                <a:satMod val="105000"/>
+                <a:tint val="67000"/>
+              </a:schemeClr>
+            </a:gs>
+            <a:gs pos="50000">
+              <a:schemeClr val="phClr">
+                <a:lumMod val="105000"/>
+                <a:satMod val="103000"/>
+                <a:tint val="73000"/>
+              </a:schemeClr>
+            </a:gs>
+            <a:gs pos="100000">
+              <a:schemeClr val="phClr">
+                <a:lumMod val="105000"/>
+                <a:satMod val="109000"/>
+                <a:tint val="81000"/>
+              </a:schemeClr>
+            </a:gs>
+          </a:gsLst>
+          <a:lin ang="5400000" scaled="0"/>
+        </a:gradFill>
+        <a:gradFill rotWithShape="1">
+          <a:gsLst>
+            <a:gs pos="0">
+              <a:schemeClr val="phClr">
+                <a:satMod val="103000"/>
+                <a:lumMod val="102000"/>
+                <a:tint val="94000"/>
+              </a:schemeClr>
+            </a:gs>
+            <a:gs pos="50000">
+              <a:schemeClr val="phClr">
+                <a:satMod val="110000"/>
+                <a:lumMod val="100000"/>
+                <a:shade val="100000"/>
+              </a:schemeClr>
+            </a:gs>
+            <a:gs pos="100000">
+              <a:schemeClr val="phClr">
+                <a:lumMod val="99000"/>
+                <a:satMod val="120000"/>
+                <a:shade val="78000"/>
+              </a:schemeClr>
+            </a:gs>
+          </a:gsLst>
+          <a:lin ang="5400000" scaled="0"/>
+        </a:gradFill>
+      </a:fillStyleLst>
+      <a:lnStyleLst>
+        <a:ln w="12700" cap="flat" cmpd="sng" algn="ctr">
+          <a:solidFill>
+            <a:schemeClr val="phClr"/>
+          </a:solidFill>
+          <a:prstDash val="solid"/>
+          <a:miter lim="800000"/>
+        </a:ln>
+        <a:ln w="19050" cap="flat" cmpd="sng" algn="ctr">
+          <a:solidFill>
+            <a:schemeClr val="phClr"/>
+          </a:solidFill>
+          <a:prstDash val="solid"/>
+          <a:miter lim="800000"/>
+        </a:ln>
+        <a:ln w="25400" cap="flat" cmpd="sng" algn="ctr">
+          <a:solidFill>
+            <a:schemeClr val="phClr"/>
+          </a:solidFill>
+          <a:prstDash val="solid"/>
+          <a:miter lim="800000"/>
+        </a:ln>
+      </a:lnStyleLst>
+      <a:effectStyleLst>
+        <a:effectStyle>
+          <a:effectLst/>
+        </a:effectStyle>
+        <a:effectStyle>
+          <a:effectLst/>
+        </a:effectStyle>
+        <a:effectStyle>
+          <a:effectLst>
+            <a:outerShdw blurRad="57150" dist="19050" dir="5400000" algn="ctr" rotWithShape="0">
+              <a:srgbClr val="000000">
+                <a:alpha val="63000"/>
+              </a:srgbClr>
+            </a:outerShdw>
+          </a:effectLst>
+        </a:effectStyle>
+      </a:effectStyleLst>
+      <a:bgFillStyleLst>
+        <a:solidFill>
+          <a:schemeClr val="phClr"/>
+        </a:solidFill>
+        <a:solidFill>
+          <a:schemeClr val="phClr">
+            <a:tint val="95000"/>
+            <a:satMod val="170000"/>
+          </a:schemeClr>
+        </a:solidFill>
+        <a:gradFill rotWithShape="1">
+          <a:gsLst>
+            <a:gs pos="0">
+              <a:schemeClr val="phClr">
+                <a:tint val="93000"/>
+                <a:satMod val="150000"/>
+                <a:shade val="98000"/>
+                <a:lumMod val="102000"/>
+              </a:schemeClr>
+            </a:gs>
+            <a:gs pos="50000">
+              <a:schemeClr val="phClr">
+                <a:tint val="98000"/>
+                <a:satMod val="130000"/>
+                <a:shade val="90000"/>
+                <a:lumMod val="103000"/>
+              </a:schemeClr>
+            </a:gs>
+            <a:gs pos="100000">
+              <a:schemeClr val="phClr">
+                <a:shade val="63000"/>
+                <a:satMod val="120000"/>
+              </a:schemeClr>
+            </a:gs>
+          </a:gsLst>
+          <a:lin ang="5400000" scaled="0"/>
+        </a:gradFill>
+      </a:bgFillStyleLst>
+    </a:fmtScheme>
+  </a:themeElements>
+  <a:objectDefaults>
+    <a:lnDef>
+      <a:spPr/>
+      <a:bodyPr/>
+      <a:lstStyle/>
+      <a:style>
+        <a:lnRef idx="2">
+          <a:schemeClr val="accent1"/>
+        </a:lnRef>
+        <a:fillRef idx="0">
+          <a:schemeClr val="accent1"/>
+        </a:fillRef>
+        <a:effectRef idx="1">
+          <a:schemeClr val="accent1"/>
+        </a:effectRef>
+        <a:fontRef idx="minor">
+          <a:schemeClr val="tx1"/>
+        </a:fontRef>
+      </a:style>
+    </a:lnDef>
+  </a:objectDefaults>
+  <a:extraClrSchemeLst/>
+  <a:extLst>
+    <a:ext uri="{05A4C25C-085E-4340-85A3-A5531E510DB2}">
+      <thm15:themeFamily xmlns:thm15="http://schemas.microsoft.com/office/thememl/2012/main" name="Office Theme" id="{2E142A2C-CD16-42D6-873A-C26D2A0506FA}" vid="{1BDDFF52-6CD6-40A5-AB3C-68EB2F1E4D0A}"/>
+    </a:ext>
+  </a:extLst>
+</a:theme>
 </file>
</xml_diff>